<commit_message>
create intro to branching page, delete orinigal branching page and remove DigrammeR as a dependency
</commit_message>
<xml_diff>
--- a/making basic workflow diagram.pptx
+++ b/making basic workflow diagram.pptx
@@ -5,10 +5,10 @@
     <p:sldMasterId id="2147483648" r:id="rId1"/>
   </p:sldMasterIdLst>
   <p:notesMasterIdLst>
-    <p:notesMasterId r:id="rId29"/>
+    <p:notesMasterId r:id="rId34"/>
   </p:notesMasterIdLst>
   <p:handoutMasterIdLst>
-    <p:handoutMasterId r:id="rId30"/>
+    <p:handoutMasterId r:id="rId35"/>
   </p:handoutMasterIdLst>
   <p:sldIdLst>
     <p:sldId id="315" r:id="rId2"/>
@@ -38,6 +38,11 @@
     <p:sldId id="333" r:id="rId26"/>
     <p:sldId id="334" r:id="rId27"/>
     <p:sldId id="335" r:id="rId28"/>
+    <p:sldId id="336" r:id="rId29"/>
+    <p:sldId id="337" r:id="rId30"/>
+    <p:sldId id="338" r:id="rId31"/>
+    <p:sldId id="339" r:id="rId32"/>
+    <p:sldId id="340" r:id="rId33"/>
   </p:sldIdLst>
   <p:sldSz cx="12192000" cy="6858000"/>
   <p:notesSz cx="6889750" cy="10021888"/>
@@ -168,6 +173,11 @@
             <p14:sldId id="333"/>
             <p14:sldId id="334"/>
             <p14:sldId id="335"/>
+            <p14:sldId id="336"/>
+            <p14:sldId id="337"/>
+            <p14:sldId id="338"/>
+            <p14:sldId id="339"/>
+            <p14:sldId id="340"/>
           </p14:sldIdLst>
         </p14:section>
         <p14:section name="Instructions" id="{153BA7F6-3655-455F-8B0C-D1B6C9FAEB1A}">
@@ -17442,6 +17452,577 @@
 </p:sld>
 </file>
 
+<file path=ppt/slides/slide28.xml><?xml version="1.0" encoding="utf-8"?>
+<p:sld xmlns:a="http://schemas.openxmlformats.org/drawingml/2006/main" xmlns:r="http://schemas.openxmlformats.org/officeDocument/2006/relationships" xmlns:p="http://schemas.openxmlformats.org/presentationml/2006/main">
+  <p:cSld>
+    <p:spTree>
+      <p:nvGrpSpPr>
+        <p:cNvPr id="1" name=""/>
+        <p:cNvGrpSpPr/>
+        <p:nvPr/>
+      </p:nvGrpSpPr>
+      <p:grpSpPr>
+        <a:xfrm>
+          <a:off x="0" y="0"/>
+          <a:ext cx="0" cy="0"/>
+          <a:chOff x="0" y="0"/>
+          <a:chExt cx="0" cy="0"/>
+        </a:xfrm>
+      </p:grpSpPr>
+      <p:sp>
+        <p:nvSpPr>
+          <p:cNvPr id="2" name="Title 1">
+            <a:extLst>
+              <a:ext uri="{FF2B5EF4-FFF2-40B4-BE49-F238E27FC236}">
+                <a16:creationId xmlns:a16="http://schemas.microsoft.com/office/drawing/2014/main" id="{5A9FB0DD-B293-4BFC-98C6-FC333E03A0E0}"/>
+              </a:ext>
+            </a:extLst>
+          </p:cNvPr>
+          <p:cNvSpPr>
+            <a:spLocks noGrp="1"/>
+          </p:cNvSpPr>
+          <p:nvPr>
+            <p:ph type="title"/>
+          </p:nvPr>
+        </p:nvSpPr>
+        <p:spPr/>
+        <p:txBody>
+          <a:bodyPr/>
+          <a:lstStyle/>
+          <a:p>
+            <a:r>
+              <a:rPr lang="en-GB" dirty="0"/>
+              <a:t>Intro to branching workflow</a:t>
+            </a:r>
+          </a:p>
+        </p:txBody>
+      </p:sp>
+      <p:sp>
+        <p:nvSpPr>
+          <p:cNvPr id="3" name="Footer Placeholder 2">
+            <a:extLst>
+              <a:ext uri="{FF2B5EF4-FFF2-40B4-BE49-F238E27FC236}">
+                <a16:creationId xmlns:a16="http://schemas.microsoft.com/office/drawing/2014/main" id="{7DE634BD-5257-495C-9B9E-960A5202504F}"/>
+              </a:ext>
+            </a:extLst>
+          </p:cNvPr>
+          <p:cNvSpPr>
+            <a:spLocks noGrp="1"/>
+          </p:cNvSpPr>
+          <p:nvPr>
+            <p:ph type="ftr" sz="quarter" idx="11"/>
+          </p:nvPr>
+        </p:nvSpPr>
+        <p:spPr/>
+        <p:txBody>
+          <a:bodyPr/>
+          <a:lstStyle/>
+          <a:p>
+            <a:r>
+              <a:rPr lang="en-US"/>
+              <a:t>REPLACE WITH CONFIDENTIALITY STATEMENT</a:t>
+            </a:r>
+            <a:endParaRPr lang="en-US" dirty="0"/>
+          </a:p>
+        </p:txBody>
+      </p:sp>
+      <p:sp>
+        <p:nvSpPr>
+          <p:cNvPr id="4" name="Slide Number Placeholder 3">
+            <a:extLst>
+              <a:ext uri="{FF2B5EF4-FFF2-40B4-BE49-F238E27FC236}">
+                <a16:creationId xmlns:a16="http://schemas.microsoft.com/office/drawing/2014/main" id="{33400E84-FB12-44C4-BE0B-A5167A18AB3A}"/>
+              </a:ext>
+            </a:extLst>
+          </p:cNvPr>
+          <p:cNvSpPr>
+            <a:spLocks noGrp="1"/>
+          </p:cNvSpPr>
+          <p:nvPr>
+            <p:ph type="sldNum" sz="quarter" idx="4"/>
+          </p:nvPr>
+        </p:nvSpPr>
+        <p:spPr/>
+        <p:txBody>
+          <a:bodyPr/>
+          <a:lstStyle/>
+          <a:p>
+            <a:fld id="{AC0D2BFD-67D9-3D46-AF5A-F0A3088F6DF5}" type="slidenum">
+              <a:rPr lang="en-US" smtClean="0"/>
+              <a:pPr/>
+              <a:t>28</a:t>
+            </a:fld>
+            <a:endParaRPr lang="en-US" dirty="0"/>
+          </a:p>
+        </p:txBody>
+      </p:sp>
+    </p:spTree>
+    <p:extLst>
+      <p:ext uri="{BB962C8B-B14F-4D97-AF65-F5344CB8AC3E}">
+        <p14:creationId xmlns:p14="http://schemas.microsoft.com/office/powerpoint/2010/main" val="2627541206"/>
+      </p:ext>
+    </p:extLst>
+  </p:cSld>
+  <p:clrMapOvr>
+    <a:masterClrMapping/>
+  </p:clrMapOvr>
+  <mc:AlternateContent xmlns:mc="http://schemas.openxmlformats.org/markup-compatibility/2006" xmlns:p14="http://schemas.microsoft.com/office/powerpoint/2010/main">
+    <mc:Choice Requires="p14">
+      <p:transition spd="med" p14:dur="700">
+        <p:fade/>
+      </p:transition>
+    </mc:Choice>
+    <mc:Fallback xmlns="">
+      <p:transition spd="med">
+        <p:fade/>
+      </p:transition>
+    </mc:Fallback>
+  </mc:AlternateContent>
+</p:sld>
+</file>
+
+<file path=ppt/slides/slide29.xml><?xml version="1.0" encoding="utf-8"?>
+<p:sld xmlns:a="http://schemas.openxmlformats.org/drawingml/2006/main" xmlns:r="http://schemas.openxmlformats.org/officeDocument/2006/relationships" xmlns:p="http://schemas.openxmlformats.org/presentationml/2006/main">
+  <p:cSld>
+    <p:spTree>
+      <p:nvGrpSpPr>
+        <p:cNvPr id="1" name=""/>
+        <p:cNvGrpSpPr/>
+        <p:nvPr/>
+      </p:nvGrpSpPr>
+      <p:grpSpPr>
+        <a:xfrm>
+          <a:off x="0" y="0"/>
+          <a:ext cx="0" cy="0"/>
+          <a:chOff x="0" y="0"/>
+          <a:chExt cx="0" cy="0"/>
+        </a:xfrm>
+      </p:grpSpPr>
+      <p:grpSp>
+        <p:nvGrpSpPr>
+          <p:cNvPr id="5" name="Group 4">
+            <a:extLst>
+              <a:ext uri="{FF2B5EF4-FFF2-40B4-BE49-F238E27FC236}">
+                <a16:creationId xmlns:a16="http://schemas.microsoft.com/office/drawing/2014/main" id="{301FC04C-9592-46C4-97F9-2DA71A6A4041}"/>
+              </a:ext>
+            </a:extLst>
+          </p:cNvPr>
+          <p:cNvGrpSpPr/>
+          <p:nvPr/>
+        </p:nvGrpSpPr>
+        <p:grpSpPr>
+          <a:xfrm>
+            <a:off x="287645" y="2590101"/>
+            <a:ext cx="4005000" cy="838899"/>
+            <a:chOff x="1610686" y="2427215"/>
+            <a:chExt cx="4005000" cy="838899"/>
+          </a:xfrm>
+        </p:grpSpPr>
+        <p:sp>
+          <p:nvSpPr>
+            <p:cNvPr id="6" name="Oval 5">
+              <a:extLst>
+                <a:ext uri="{FF2B5EF4-FFF2-40B4-BE49-F238E27FC236}">
+                  <a16:creationId xmlns:a16="http://schemas.microsoft.com/office/drawing/2014/main" id="{936CE5C0-6164-44AC-909C-343BE70F065C}"/>
+                </a:ext>
+              </a:extLst>
+            </p:cNvPr>
+            <p:cNvSpPr/>
+            <p:nvPr/>
+          </p:nvSpPr>
+          <p:spPr>
+            <a:xfrm>
+              <a:off x="1610686" y="2427215"/>
+              <a:ext cx="838800" cy="838899"/>
+            </a:xfrm>
+            <a:prstGeom prst="ellipse">
+              <a:avLst/>
+            </a:prstGeom>
+            <a:solidFill>
+              <a:schemeClr val="accent2">
+                <a:alpha val="50000"/>
+              </a:schemeClr>
+            </a:solidFill>
+            <a:ln>
+              <a:noFill/>
+            </a:ln>
+          </p:spPr>
+          <p:style>
+            <a:lnRef idx="0">
+              <a:scrgbClr r="0" g="0" b="0"/>
+            </a:lnRef>
+            <a:fillRef idx="0">
+              <a:scrgbClr r="0" g="0" b="0"/>
+            </a:fillRef>
+            <a:effectRef idx="0">
+              <a:scrgbClr r="0" g="0" b="0"/>
+            </a:effectRef>
+            <a:fontRef idx="minor">
+              <a:schemeClr val="lt1"/>
+            </a:fontRef>
+          </p:style>
+          <p:txBody>
+            <a:bodyPr rtlCol="0" anchor="ctr"/>
+            <a:lstStyle/>
+            <a:p>
+              <a:pPr algn="ctr"/>
+              <a:endParaRPr lang="en-GB" dirty="0"/>
+            </a:p>
+          </p:txBody>
+        </p:sp>
+        <p:sp>
+          <p:nvSpPr>
+            <p:cNvPr id="7" name="Oval 6">
+              <a:extLst>
+                <a:ext uri="{FF2B5EF4-FFF2-40B4-BE49-F238E27FC236}">
+                  <a16:creationId xmlns:a16="http://schemas.microsoft.com/office/drawing/2014/main" id="{F3F6C70B-C3ED-4BF7-9667-B033842F747D}"/>
+                </a:ext>
+              </a:extLst>
+            </p:cNvPr>
+            <p:cNvSpPr/>
+            <p:nvPr/>
+          </p:nvSpPr>
+          <p:spPr>
+            <a:xfrm>
+              <a:off x="3193786" y="2427215"/>
+              <a:ext cx="838800" cy="838899"/>
+            </a:xfrm>
+            <a:prstGeom prst="ellipse">
+              <a:avLst/>
+            </a:prstGeom>
+            <a:solidFill>
+              <a:schemeClr val="accent2">
+                <a:alpha val="50000"/>
+              </a:schemeClr>
+            </a:solidFill>
+            <a:ln>
+              <a:noFill/>
+            </a:ln>
+          </p:spPr>
+          <p:style>
+            <a:lnRef idx="0">
+              <a:scrgbClr r="0" g="0" b="0"/>
+            </a:lnRef>
+            <a:fillRef idx="0">
+              <a:scrgbClr r="0" g="0" b="0"/>
+            </a:fillRef>
+            <a:effectRef idx="0">
+              <a:scrgbClr r="0" g="0" b="0"/>
+            </a:effectRef>
+            <a:fontRef idx="minor">
+              <a:schemeClr val="lt1"/>
+            </a:fontRef>
+          </p:style>
+          <p:txBody>
+            <a:bodyPr rtlCol="0" anchor="ctr"/>
+            <a:lstStyle/>
+            <a:p>
+              <a:pPr algn="ctr"/>
+              <a:endParaRPr lang="en-GB" dirty="0"/>
+            </a:p>
+          </p:txBody>
+        </p:sp>
+        <p:sp>
+          <p:nvSpPr>
+            <p:cNvPr id="8" name="Oval 7">
+              <a:extLst>
+                <a:ext uri="{FF2B5EF4-FFF2-40B4-BE49-F238E27FC236}">
+                  <a16:creationId xmlns:a16="http://schemas.microsoft.com/office/drawing/2014/main" id="{CBEE916C-6335-4905-8A98-04BB985989F5}"/>
+                </a:ext>
+              </a:extLst>
+            </p:cNvPr>
+            <p:cNvSpPr/>
+            <p:nvPr/>
+          </p:nvSpPr>
+          <p:spPr>
+            <a:xfrm>
+              <a:off x="4776886" y="2427215"/>
+              <a:ext cx="838800" cy="838899"/>
+            </a:xfrm>
+            <a:prstGeom prst="ellipse">
+              <a:avLst/>
+            </a:prstGeom>
+            <a:solidFill>
+              <a:schemeClr val="accent2">
+                <a:alpha val="50000"/>
+              </a:schemeClr>
+            </a:solidFill>
+            <a:ln>
+              <a:noFill/>
+            </a:ln>
+          </p:spPr>
+          <p:style>
+            <a:lnRef idx="0">
+              <a:scrgbClr r="0" g="0" b="0"/>
+            </a:lnRef>
+            <a:fillRef idx="0">
+              <a:scrgbClr r="0" g="0" b="0"/>
+            </a:fillRef>
+            <a:effectRef idx="0">
+              <a:scrgbClr r="0" g="0" b="0"/>
+            </a:effectRef>
+            <a:fontRef idx="minor">
+              <a:schemeClr val="lt1"/>
+            </a:fontRef>
+          </p:style>
+          <p:txBody>
+            <a:bodyPr rtlCol="0" anchor="ctr"/>
+            <a:lstStyle/>
+            <a:p>
+              <a:pPr algn="ctr"/>
+              <a:endParaRPr lang="en-GB" dirty="0"/>
+            </a:p>
+          </p:txBody>
+        </p:sp>
+        <p:cxnSp>
+          <p:nvCxnSpPr>
+            <p:cNvPr id="10" name="Straight Connector 9">
+              <a:extLst>
+                <a:ext uri="{FF2B5EF4-FFF2-40B4-BE49-F238E27FC236}">
+                  <a16:creationId xmlns:a16="http://schemas.microsoft.com/office/drawing/2014/main" id="{CBC8EE9D-A29D-4139-B54A-67590A19E522}"/>
+                </a:ext>
+              </a:extLst>
+            </p:cNvPr>
+            <p:cNvCxnSpPr>
+              <a:cxnSpLocks/>
+              <a:stCxn id="6" idx="6"/>
+            </p:cNvCxnSpPr>
+            <p:nvPr/>
+          </p:nvCxnSpPr>
+          <p:spPr>
+            <a:xfrm>
+              <a:off x="2449486" y="2846665"/>
+              <a:ext cx="744300" cy="0"/>
+            </a:xfrm>
+            <a:prstGeom prst="line">
+              <a:avLst/>
+            </a:prstGeom>
+          </p:spPr>
+          <p:style>
+            <a:lnRef idx="1">
+              <a:schemeClr val="accent2"/>
+            </a:lnRef>
+            <a:fillRef idx="0">
+              <a:schemeClr val="accent2"/>
+            </a:fillRef>
+            <a:effectRef idx="0">
+              <a:schemeClr val="accent2"/>
+            </a:effectRef>
+            <a:fontRef idx="minor">
+              <a:schemeClr val="tx1"/>
+            </a:fontRef>
+          </p:style>
+        </p:cxnSp>
+        <p:cxnSp>
+          <p:nvCxnSpPr>
+            <p:cNvPr id="11" name="Straight Connector 10">
+              <a:extLst>
+                <a:ext uri="{FF2B5EF4-FFF2-40B4-BE49-F238E27FC236}">
+                  <a16:creationId xmlns:a16="http://schemas.microsoft.com/office/drawing/2014/main" id="{A8188FC6-C12D-4D61-A308-1DDAFACC37B5}"/>
+                </a:ext>
+              </a:extLst>
+            </p:cNvPr>
+            <p:cNvCxnSpPr>
+              <a:cxnSpLocks/>
+              <a:stCxn id="7" idx="6"/>
+              <a:endCxn id="8" idx="2"/>
+            </p:cNvCxnSpPr>
+            <p:nvPr/>
+          </p:nvCxnSpPr>
+          <p:spPr>
+            <a:xfrm>
+              <a:off x="4032586" y="2846665"/>
+              <a:ext cx="744300" cy="0"/>
+            </a:xfrm>
+            <a:prstGeom prst="line">
+              <a:avLst/>
+            </a:prstGeom>
+          </p:spPr>
+          <p:style>
+            <a:lnRef idx="1">
+              <a:schemeClr val="accent2"/>
+            </a:lnRef>
+            <a:fillRef idx="0">
+              <a:schemeClr val="accent2"/>
+            </a:fillRef>
+            <a:effectRef idx="0">
+              <a:schemeClr val="accent2"/>
+            </a:effectRef>
+            <a:fontRef idx="minor">
+              <a:schemeClr val="tx1"/>
+            </a:fontRef>
+          </p:style>
+        </p:cxnSp>
+      </p:grpSp>
+      <p:sp>
+        <p:nvSpPr>
+          <p:cNvPr id="13" name="Rectangle: Rounded Corners 12">
+            <a:extLst>
+              <a:ext uri="{FF2B5EF4-FFF2-40B4-BE49-F238E27FC236}">
+                <a16:creationId xmlns:a16="http://schemas.microsoft.com/office/drawing/2014/main" id="{1E4A7F89-0EE4-44B2-BDAA-9CD575279057}"/>
+              </a:ext>
+            </a:extLst>
+          </p:cNvPr>
+          <p:cNvSpPr/>
+          <p:nvPr/>
+        </p:nvSpPr>
+        <p:spPr>
+          <a:xfrm>
+            <a:off x="1509316" y="3848449"/>
+            <a:ext cx="2701255" cy="1367405"/>
+          </a:xfrm>
+          <a:prstGeom prst="roundRect">
+            <a:avLst/>
+          </a:prstGeom>
+        </p:spPr>
+        <p:style>
+          <a:lnRef idx="1">
+            <a:schemeClr val="dk1"/>
+          </a:lnRef>
+          <a:fillRef idx="2">
+            <a:schemeClr val="dk1"/>
+          </a:fillRef>
+          <a:effectRef idx="1">
+            <a:schemeClr val="dk1"/>
+          </a:effectRef>
+          <a:fontRef idx="minor">
+            <a:schemeClr val="dk1"/>
+          </a:fontRef>
+        </p:style>
+        <p:txBody>
+          <a:bodyPr rtlCol="0" anchor="ctr"/>
+          <a:lstStyle/>
+          <a:p>
+            <a:pPr algn="ctr"/>
+            <a:r>
+              <a:rPr lang="en-GB" dirty="0"/>
+              <a:t>Development work is being carried out on this branch</a:t>
+            </a:r>
+          </a:p>
+        </p:txBody>
+      </p:sp>
+      <p:sp>
+        <p:nvSpPr>
+          <p:cNvPr id="14" name="Rectangle: Diagonal Corners Rounded 13">
+            <a:extLst>
+              <a:ext uri="{FF2B5EF4-FFF2-40B4-BE49-F238E27FC236}">
+                <a16:creationId xmlns:a16="http://schemas.microsoft.com/office/drawing/2014/main" id="{72308B0A-46FB-4622-97AF-3C2A9F25C8A6}"/>
+              </a:ext>
+            </a:extLst>
+          </p:cNvPr>
+          <p:cNvSpPr/>
+          <p:nvPr/>
+        </p:nvSpPr>
+        <p:spPr>
+          <a:xfrm>
+            <a:off x="3399267" y="1549873"/>
+            <a:ext cx="947956" cy="620779"/>
+          </a:xfrm>
+          <a:prstGeom prst="round2DiagRect">
+            <a:avLst/>
+          </a:prstGeom>
+          <a:solidFill>
+            <a:schemeClr val="accent2">
+              <a:alpha val="50000"/>
+            </a:schemeClr>
+          </a:solidFill>
+          <a:ln>
+            <a:noFill/>
+          </a:ln>
+        </p:spPr>
+        <p:style>
+          <a:lnRef idx="0">
+            <a:scrgbClr r="0" g="0" b="0"/>
+          </a:lnRef>
+          <a:fillRef idx="0">
+            <a:scrgbClr r="0" g="0" b="0"/>
+          </a:fillRef>
+          <a:effectRef idx="0">
+            <a:scrgbClr r="0" g="0" b="0"/>
+          </a:effectRef>
+          <a:fontRef idx="minor">
+            <a:schemeClr val="lt1"/>
+          </a:fontRef>
+        </p:style>
+        <p:txBody>
+          <a:bodyPr rtlCol="0" anchor="ctr"/>
+          <a:lstStyle/>
+          <a:p>
+            <a:pPr algn="ctr"/>
+            <a:r>
+              <a:rPr lang="en-GB" sz="1600" dirty="0"/>
+              <a:t>Main branch</a:t>
+            </a:r>
+          </a:p>
+        </p:txBody>
+      </p:sp>
+      <p:cxnSp>
+        <p:nvCxnSpPr>
+          <p:cNvPr id="16" name="Straight Arrow Connector 15">
+            <a:extLst>
+              <a:ext uri="{FF2B5EF4-FFF2-40B4-BE49-F238E27FC236}">
+                <a16:creationId xmlns:a16="http://schemas.microsoft.com/office/drawing/2014/main" id="{6B754E91-43B3-40B3-A128-97B6456522D6}"/>
+              </a:ext>
+            </a:extLst>
+          </p:cNvPr>
+          <p:cNvCxnSpPr>
+            <a:stCxn id="14" idx="1"/>
+            <a:endCxn id="8" idx="0"/>
+          </p:cNvCxnSpPr>
+          <p:nvPr/>
+        </p:nvCxnSpPr>
+        <p:spPr>
+          <a:xfrm>
+            <a:off x="3873245" y="2170652"/>
+            <a:ext cx="0" cy="419449"/>
+          </a:xfrm>
+          <a:prstGeom prst="straightConnector1">
+            <a:avLst/>
+          </a:prstGeom>
+          <a:ln>
+            <a:tailEnd type="triangle"/>
+          </a:ln>
+        </p:spPr>
+        <p:style>
+          <a:lnRef idx="1">
+            <a:schemeClr val="dk1"/>
+          </a:lnRef>
+          <a:fillRef idx="0">
+            <a:schemeClr val="dk1"/>
+          </a:fillRef>
+          <a:effectRef idx="0">
+            <a:schemeClr val="dk1"/>
+          </a:effectRef>
+          <a:fontRef idx="minor">
+            <a:schemeClr val="tx1"/>
+          </a:fontRef>
+        </p:style>
+      </p:cxnSp>
+    </p:spTree>
+    <p:extLst>
+      <p:ext uri="{BB962C8B-B14F-4D97-AF65-F5344CB8AC3E}">
+        <p14:creationId xmlns:p14="http://schemas.microsoft.com/office/powerpoint/2010/main" val="1365324185"/>
+      </p:ext>
+    </p:extLst>
+  </p:cSld>
+  <p:clrMapOvr>
+    <a:masterClrMapping/>
+  </p:clrMapOvr>
+  <mc:AlternateContent xmlns:mc="http://schemas.openxmlformats.org/markup-compatibility/2006" xmlns:p14="http://schemas.microsoft.com/office/powerpoint/2010/main">
+    <mc:Choice Requires="p14">
+      <p:transition spd="med" p14:dur="700">
+        <p:fade/>
+      </p:transition>
+    </mc:Choice>
+    <mc:Fallback xmlns="">
+      <p:transition spd="med">
+        <p:fade/>
+      </p:transition>
+    </mc:Fallback>
+  </mc:AlternateContent>
+</p:sld>
+</file>
+
 <file path=ppt/slides/slide3.xml><?xml version="1.0" encoding="utf-8"?>
 <p:sld xmlns:a="http://schemas.openxmlformats.org/drawingml/2006/main" xmlns:r="http://schemas.openxmlformats.org/officeDocument/2006/relationships" xmlns:p="http://schemas.openxmlformats.org/presentationml/2006/main">
   <p:cSld>
@@ -18003,6 +18584,2872 @@
     <p:extLst>
       <p:ext uri="{BB962C8B-B14F-4D97-AF65-F5344CB8AC3E}">
         <p14:creationId xmlns:p14="http://schemas.microsoft.com/office/powerpoint/2010/main" val="3918752189"/>
+      </p:ext>
+    </p:extLst>
+  </p:cSld>
+  <p:clrMapOvr>
+    <a:masterClrMapping/>
+  </p:clrMapOvr>
+  <mc:AlternateContent xmlns:mc="http://schemas.openxmlformats.org/markup-compatibility/2006" xmlns:p14="http://schemas.microsoft.com/office/powerpoint/2010/main">
+    <mc:Choice Requires="p14">
+      <p:transition spd="med" p14:dur="700">
+        <p:fade/>
+      </p:transition>
+    </mc:Choice>
+    <mc:Fallback xmlns="">
+      <p:transition spd="med">
+        <p:fade/>
+      </p:transition>
+    </mc:Fallback>
+  </mc:AlternateContent>
+</p:sld>
+</file>
+
+<file path=ppt/slides/slide30.xml><?xml version="1.0" encoding="utf-8"?>
+<p:sld xmlns:a="http://schemas.openxmlformats.org/drawingml/2006/main" xmlns:r="http://schemas.openxmlformats.org/officeDocument/2006/relationships" xmlns:p="http://schemas.openxmlformats.org/presentationml/2006/main">
+  <p:cSld>
+    <p:spTree>
+      <p:nvGrpSpPr>
+        <p:cNvPr id="1" name=""/>
+        <p:cNvGrpSpPr/>
+        <p:nvPr/>
+      </p:nvGrpSpPr>
+      <p:grpSpPr>
+        <a:xfrm>
+          <a:off x="0" y="0"/>
+          <a:ext cx="0" cy="0"/>
+          <a:chOff x="0" y="0"/>
+          <a:chExt cx="0" cy="0"/>
+        </a:xfrm>
+      </p:grpSpPr>
+      <p:sp>
+        <p:nvSpPr>
+          <p:cNvPr id="13" name="Rectangle: Rounded Corners 12">
+            <a:extLst>
+              <a:ext uri="{FF2B5EF4-FFF2-40B4-BE49-F238E27FC236}">
+                <a16:creationId xmlns:a16="http://schemas.microsoft.com/office/drawing/2014/main" id="{1E4A7F89-0EE4-44B2-BDAA-9CD575279057}"/>
+              </a:ext>
+            </a:extLst>
+          </p:cNvPr>
+          <p:cNvSpPr/>
+          <p:nvPr/>
+        </p:nvSpPr>
+        <p:spPr>
+          <a:xfrm>
+            <a:off x="1126445" y="4079146"/>
+            <a:ext cx="2807992" cy="1593907"/>
+          </a:xfrm>
+          <a:prstGeom prst="roundRect">
+            <a:avLst/>
+          </a:prstGeom>
+        </p:spPr>
+        <p:style>
+          <a:lnRef idx="1">
+            <a:schemeClr val="dk1"/>
+          </a:lnRef>
+          <a:fillRef idx="2">
+            <a:schemeClr val="dk1"/>
+          </a:fillRef>
+          <a:effectRef idx="1">
+            <a:schemeClr val="dk1"/>
+          </a:effectRef>
+          <a:fontRef idx="minor">
+            <a:schemeClr val="dk1"/>
+          </a:fontRef>
+        </p:style>
+        <p:txBody>
+          <a:bodyPr rtlCol="0" anchor="ctr"/>
+          <a:lstStyle/>
+          <a:p>
+            <a:pPr algn="ctr"/>
+            <a:r>
+              <a:rPr lang="en-GB" dirty="0"/>
+              <a:t>While working on this branch, a new branch could be created, e.g. to develop a new feature.</a:t>
+            </a:r>
+          </a:p>
+        </p:txBody>
+      </p:sp>
+      <p:sp>
+        <p:nvSpPr>
+          <p:cNvPr id="16" name="Rectangle: Diagonal Corners Rounded 15">
+            <a:extLst>
+              <a:ext uri="{FF2B5EF4-FFF2-40B4-BE49-F238E27FC236}">
+                <a16:creationId xmlns:a16="http://schemas.microsoft.com/office/drawing/2014/main" id="{403839E0-4757-428F-9612-4480AD48D5B9}"/>
+              </a:ext>
+            </a:extLst>
+          </p:cNvPr>
+          <p:cNvSpPr/>
+          <p:nvPr/>
+        </p:nvSpPr>
+        <p:spPr>
+          <a:xfrm>
+            <a:off x="4981673" y="3848449"/>
+            <a:ext cx="947956" cy="620779"/>
+          </a:xfrm>
+          <a:prstGeom prst="round2DiagRect">
+            <a:avLst/>
+          </a:prstGeom>
+          <a:solidFill>
+            <a:schemeClr val="accent2">
+              <a:alpha val="50000"/>
+            </a:schemeClr>
+          </a:solidFill>
+          <a:ln>
+            <a:noFill/>
+          </a:ln>
+        </p:spPr>
+        <p:style>
+          <a:lnRef idx="0">
+            <a:scrgbClr r="0" g="0" b="0"/>
+          </a:lnRef>
+          <a:fillRef idx="0">
+            <a:scrgbClr r="0" g="0" b="0"/>
+          </a:fillRef>
+          <a:effectRef idx="0">
+            <a:scrgbClr r="0" g="0" b="0"/>
+          </a:effectRef>
+          <a:fontRef idx="minor">
+            <a:schemeClr val="lt1"/>
+          </a:fontRef>
+        </p:style>
+        <p:txBody>
+          <a:bodyPr rtlCol="0" anchor="ctr"/>
+          <a:lstStyle/>
+          <a:p>
+            <a:pPr algn="ctr"/>
+            <a:r>
+              <a:rPr lang="en-GB" sz="1600" dirty="0"/>
+              <a:t>Main branch</a:t>
+            </a:r>
+          </a:p>
+        </p:txBody>
+      </p:sp>
+      <p:cxnSp>
+        <p:nvCxnSpPr>
+          <p:cNvPr id="17" name="Straight Arrow Connector 16">
+            <a:extLst>
+              <a:ext uri="{FF2B5EF4-FFF2-40B4-BE49-F238E27FC236}">
+                <a16:creationId xmlns:a16="http://schemas.microsoft.com/office/drawing/2014/main" id="{74551AD8-0D37-4C85-8073-71EBC8B6A565}"/>
+              </a:ext>
+            </a:extLst>
+          </p:cNvPr>
+          <p:cNvCxnSpPr>
+            <a:cxnSpLocks/>
+          </p:cNvCxnSpPr>
+          <p:nvPr/>
+        </p:nvCxnSpPr>
+        <p:spPr>
+          <a:xfrm flipV="1">
+            <a:off x="5452200" y="3429000"/>
+            <a:ext cx="0" cy="419449"/>
+          </a:xfrm>
+          <a:prstGeom prst="straightConnector1">
+            <a:avLst/>
+          </a:prstGeom>
+          <a:ln>
+            <a:tailEnd type="triangle"/>
+          </a:ln>
+        </p:spPr>
+        <p:style>
+          <a:lnRef idx="1">
+            <a:schemeClr val="dk1"/>
+          </a:lnRef>
+          <a:fillRef idx="0">
+            <a:schemeClr val="dk1"/>
+          </a:fillRef>
+          <a:effectRef idx="0">
+            <a:schemeClr val="dk1"/>
+          </a:effectRef>
+          <a:fontRef idx="minor">
+            <a:schemeClr val="tx1"/>
+          </a:fontRef>
+        </p:style>
+      </p:cxnSp>
+      <p:grpSp>
+        <p:nvGrpSpPr>
+          <p:cNvPr id="19" name="Group 18">
+            <a:extLst>
+              <a:ext uri="{FF2B5EF4-FFF2-40B4-BE49-F238E27FC236}">
+                <a16:creationId xmlns:a16="http://schemas.microsoft.com/office/drawing/2014/main" id="{269D3782-5F2D-4846-A561-56DCEF504C72}"/>
+              </a:ext>
+            </a:extLst>
+          </p:cNvPr>
+          <p:cNvGrpSpPr/>
+          <p:nvPr/>
+        </p:nvGrpSpPr>
+        <p:grpSpPr>
+          <a:xfrm>
+            <a:off x="287645" y="2590101"/>
+            <a:ext cx="4005000" cy="838899"/>
+            <a:chOff x="1610686" y="2427215"/>
+            <a:chExt cx="4005000" cy="838899"/>
+          </a:xfrm>
+        </p:grpSpPr>
+        <p:sp>
+          <p:nvSpPr>
+            <p:cNvPr id="20" name="Oval 19">
+              <a:extLst>
+                <a:ext uri="{FF2B5EF4-FFF2-40B4-BE49-F238E27FC236}">
+                  <a16:creationId xmlns:a16="http://schemas.microsoft.com/office/drawing/2014/main" id="{3B5A2C4A-CA16-44A7-A144-D182126ABD50}"/>
+                </a:ext>
+              </a:extLst>
+            </p:cNvPr>
+            <p:cNvSpPr/>
+            <p:nvPr/>
+          </p:nvSpPr>
+          <p:spPr>
+            <a:xfrm>
+              <a:off x="1610686" y="2427215"/>
+              <a:ext cx="838800" cy="838899"/>
+            </a:xfrm>
+            <a:prstGeom prst="ellipse">
+              <a:avLst/>
+            </a:prstGeom>
+            <a:solidFill>
+              <a:schemeClr val="accent2">
+                <a:alpha val="50000"/>
+              </a:schemeClr>
+            </a:solidFill>
+            <a:ln>
+              <a:noFill/>
+            </a:ln>
+          </p:spPr>
+          <p:style>
+            <a:lnRef idx="0">
+              <a:scrgbClr r="0" g="0" b="0"/>
+            </a:lnRef>
+            <a:fillRef idx="0">
+              <a:scrgbClr r="0" g="0" b="0"/>
+            </a:fillRef>
+            <a:effectRef idx="0">
+              <a:scrgbClr r="0" g="0" b="0"/>
+            </a:effectRef>
+            <a:fontRef idx="minor">
+              <a:schemeClr val="lt1"/>
+            </a:fontRef>
+          </p:style>
+          <p:txBody>
+            <a:bodyPr rtlCol="0" anchor="ctr"/>
+            <a:lstStyle/>
+            <a:p>
+              <a:pPr algn="ctr"/>
+              <a:endParaRPr lang="en-GB" dirty="0"/>
+            </a:p>
+          </p:txBody>
+        </p:sp>
+        <p:sp>
+          <p:nvSpPr>
+            <p:cNvPr id="21" name="Oval 20">
+              <a:extLst>
+                <a:ext uri="{FF2B5EF4-FFF2-40B4-BE49-F238E27FC236}">
+                  <a16:creationId xmlns:a16="http://schemas.microsoft.com/office/drawing/2014/main" id="{A2E235D1-3D5B-48E3-B005-235179F6D922}"/>
+                </a:ext>
+              </a:extLst>
+            </p:cNvPr>
+            <p:cNvSpPr/>
+            <p:nvPr/>
+          </p:nvSpPr>
+          <p:spPr>
+            <a:xfrm>
+              <a:off x="3193786" y="2427215"/>
+              <a:ext cx="838800" cy="838899"/>
+            </a:xfrm>
+            <a:prstGeom prst="ellipse">
+              <a:avLst/>
+            </a:prstGeom>
+            <a:solidFill>
+              <a:schemeClr val="accent2">
+                <a:alpha val="50000"/>
+              </a:schemeClr>
+            </a:solidFill>
+            <a:ln>
+              <a:noFill/>
+            </a:ln>
+          </p:spPr>
+          <p:style>
+            <a:lnRef idx="0">
+              <a:scrgbClr r="0" g="0" b="0"/>
+            </a:lnRef>
+            <a:fillRef idx="0">
+              <a:scrgbClr r="0" g="0" b="0"/>
+            </a:fillRef>
+            <a:effectRef idx="0">
+              <a:scrgbClr r="0" g="0" b="0"/>
+            </a:effectRef>
+            <a:fontRef idx="minor">
+              <a:schemeClr val="lt1"/>
+            </a:fontRef>
+          </p:style>
+          <p:txBody>
+            <a:bodyPr rtlCol="0" anchor="ctr"/>
+            <a:lstStyle/>
+            <a:p>
+              <a:pPr algn="ctr"/>
+              <a:endParaRPr lang="en-GB" dirty="0"/>
+            </a:p>
+          </p:txBody>
+        </p:sp>
+        <p:sp>
+          <p:nvSpPr>
+            <p:cNvPr id="22" name="Oval 21">
+              <a:extLst>
+                <a:ext uri="{FF2B5EF4-FFF2-40B4-BE49-F238E27FC236}">
+                  <a16:creationId xmlns:a16="http://schemas.microsoft.com/office/drawing/2014/main" id="{E2D2754B-CC1E-4EB9-874D-8AFB0F5B25EB}"/>
+                </a:ext>
+              </a:extLst>
+            </p:cNvPr>
+            <p:cNvSpPr/>
+            <p:nvPr/>
+          </p:nvSpPr>
+          <p:spPr>
+            <a:xfrm>
+              <a:off x="4776886" y="2427215"/>
+              <a:ext cx="838800" cy="838899"/>
+            </a:xfrm>
+            <a:prstGeom prst="ellipse">
+              <a:avLst/>
+            </a:prstGeom>
+            <a:solidFill>
+              <a:schemeClr val="accent2">
+                <a:alpha val="50000"/>
+              </a:schemeClr>
+            </a:solidFill>
+            <a:ln>
+              <a:noFill/>
+            </a:ln>
+          </p:spPr>
+          <p:style>
+            <a:lnRef idx="0">
+              <a:scrgbClr r="0" g="0" b="0"/>
+            </a:lnRef>
+            <a:fillRef idx="0">
+              <a:scrgbClr r="0" g="0" b="0"/>
+            </a:fillRef>
+            <a:effectRef idx="0">
+              <a:scrgbClr r="0" g="0" b="0"/>
+            </a:effectRef>
+            <a:fontRef idx="minor">
+              <a:schemeClr val="lt1"/>
+            </a:fontRef>
+          </p:style>
+          <p:txBody>
+            <a:bodyPr rtlCol="0" anchor="ctr"/>
+            <a:lstStyle/>
+            <a:p>
+              <a:pPr algn="ctr"/>
+              <a:endParaRPr lang="en-GB" dirty="0"/>
+            </a:p>
+          </p:txBody>
+        </p:sp>
+        <p:cxnSp>
+          <p:nvCxnSpPr>
+            <p:cNvPr id="23" name="Straight Connector 22">
+              <a:extLst>
+                <a:ext uri="{FF2B5EF4-FFF2-40B4-BE49-F238E27FC236}">
+                  <a16:creationId xmlns:a16="http://schemas.microsoft.com/office/drawing/2014/main" id="{D05DA3C7-4173-462B-BA15-9FCD562D1955}"/>
+                </a:ext>
+              </a:extLst>
+            </p:cNvPr>
+            <p:cNvCxnSpPr>
+              <a:cxnSpLocks/>
+              <a:stCxn id="20" idx="6"/>
+            </p:cNvCxnSpPr>
+            <p:nvPr/>
+          </p:nvCxnSpPr>
+          <p:spPr>
+            <a:xfrm>
+              <a:off x="2449486" y="2846665"/>
+              <a:ext cx="744300" cy="0"/>
+            </a:xfrm>
+            <a:prstGeom prst="line">
+              <a:avLst/>
+            </a:prstGeom>
+          </p:spPr>
+          <p:style>
+            <a:lnRef idx="1">
+              <a:schemeClr val="accent2"/>
+            </a:lnRef>
+            <a:fillRef idx="0">
+              <a:schemeClr val="accent2"/>
+            </a:fillRef>
+            <a:effectRef idx="0">
+              <a:schemeClr val="accent2"/>
+            </a:effectRef>
+            <a:fontRef idx="minor">
+              <a:schemeClr val="tx1"/>
+            </a:fontRef>
+          </p:style>
+        </p:cxnSp>
+        <p:cxnSp>
+          <p:nvCxnSpPr>
+            <p:cNvPr id="24" name="Straight Connector 23">
+              <a:extLst>
+                <a:ext uri="{FF2B5EF4-FFF2-40B4-BE49-F238E27FC236}">
+                  <a16:creationId xmlns:a16="http://schemas.microsoft.com/office/drawing/2014/main" id="{F5A6D9EC-7A99-46E2-B3D5-219CACE97D2D}"/>
+                </a:ext>
+              </a:extLst>
+            </p:cNvPr>
+            <p:cNvCxnSpPr>
+              <a:cxnSpLocks/>
+              <a:stCxn id="21" idx="6"/>
+              <a:endCxn id="22" idx="2"/>
+            </p:cNvCxnSpPr>
+            <p:nvPr/>
+          </p:nvCxnSpPr>
+          <p:spPr>
+            <a:xfrm>
+              <a:off x="4032586" y="2846665"/>
+              <a:ext cx="744300" cy="0"/>
+            </a:xfrm>
+            <a:prstGeom prst="line">
+              <a:avLst/>
+            </a:prstGeom>
+          </p:spPr>
+          <p:style>
+            <a:lnRef idx="1">
+              <a:schemeClr val="accent2"/>
+            </a:lnRef>
+            <a:fillRef idx="0">
+              <a:schemeClr val="accent2"/>
+            </a:fillRef>
+            <a:effectRef idx="0">
+              <a:schemeClr val="accent2"/>
+            </a:effectRef>
+            <a:fontRef idx="minor">
+              <a:schemeClr val="tx1"/>
+            </a:fontRef>
+          </p:style>
+        </p:cxnSp>
+      </p:grpSp>
+      <p:sp>
+        <p:nvSpPr>
+          <p:cNvPr id="25" name="Oval 24">
+            <a:extLst>
+              <a:ext uri="{FF2B5EF4-FFF2-40B4-BE49-F238E27FC236}">
+                <a16:creationId xmlns:a16="http://schemas.microsoft.com/office/drawing/2014/main" id="{69EDCD39-0CE5-4FA4-BE32-64EF92AA7AFE}"/>
+              </a:ext>
+            </a:extLst>
+          </p:cNvPr>
+          <p:cNvSpPr/>
+          <p:nvPr/>
+        </p:nvSpPr>
+        <p:spPr>
+          <a:xfrm>
+            <a:off x="5036945" y="2590101"/>
+            <a:ext cx="838800" cy="838899"/>
+          </a:xfrm>
+          <a:prstGeom prst="ellipse">
+            <a:avLst/>
+          </a:prstGeom>
+          <a:solidFill>
+            <a:schemeClr val="accent2">
+              <a:alpha val="50000"/>
+            </a:schemeClr>
+          </a:solidFill>
+          <a:ln>
+            <a:noFill/>
+          </a:ln>
+        </p:spPr>
+        <p:style>
+          <a:lnRef idx="0">
+            <a:scrgbClr r="0" g="0" b="0"/>
+          </a:lnRef>
+          <a:fillRef idx="0">
+            <a:scrgbClr r="0" g="0" b="0"/>
+          </a:fillRef>
+          <a:effectRef idx="0">
+            <a:scrgbClr r="0" g="0" b="0"/>
+          </a:effectRef>
+          <a:fontRef idx="minor">
+            <a:schemeClr val="lt1"/>
+          </a:fontRef>
+        </p:style>
+        <p:txBody>
+          <a:bodyPr rtlCol="0" anchor="ctr"/>
+          <a:lstStyle/>
+          <a:p>
+            <a:pPr algn="ctr"/>
+            <a:endParaRPr lang="en-GB" dirty="0"/>
+          </a:p>
+        </p:txBody>
+      </p:sp>
+      <p:cxnSp>
+        <p:nvCxnSpPr>
+          <p:cNvPr id="26" name="Straight Connector 25">
+            <a:extLst>
+              <a:ext uri="{FF2B5EF4-FFF2-40B4-BE49-F238E27FC236}">
+                <a16:creationId xmlns:a16="http://schemas.microsoft.com/office/drawing/2014/main" id="{C99A3B61-0D07-4843-AE02-F8F520A1AC3F}"/>
+              </a:ext>
+            </a:extLst>
+          </p:cNvPr>
+          <p:cNvCxnSpPr>
+            <a:cxnSpLocks/>
+            <a:endCxn id="25" idx="2"/>
+          </p:cNvCxnSpPr>
+          <p:nvPr/>
+        </p:nvCxnSpPr>
+        <p:spPr>
+          <a:xfrm>
+            <a:off x="4292645" y="3009551"/>
+            <a:ext cx="744300" cy="0"/>
+          </a:xfrm>
+          <a:prstGeom prst="line">
+            <a:avLst/>
+          </a:prstGeom>
+        </p:spPr>
+        <p:style>
+          <a:lnRef idx="1">
+            <a:schemeClr val="accent2"/>
+          </a:lnRef>
+          <a:fillRef idx="0">
+            <a:schemeClr val="accent2"/>
+          </a:fillRef>
+          <a:effectRef idx="0">
+            <a:schemeClr val="accent2"/>
+          </a:effectRef>
+          <a:fontRef idx="minor">
+            <a:schemeClr val="tx1"/>
+          </a:fontRef>
+        </p:style>
+      </p:cxnSp>
+      <p:sp>
+        <p:nvSpPr>
+          <p:cNvPr id="27" name="Oval 26">
+            <a:extLst>
+              <a:ext uri="{FF2B5EF4-FFF2-40B4-BE49-F238E27FC236}">
+                <a16:creationId xmlns:a16="http://schemas.microsoft.com/office/drawing/2014/main" id="{1F097433-53E8-4B8F-BAC2-79268AFEFD6E}"/>
+              </a:ext>
+            </a:extLst>
+          </p:cNvPr>
+          <p:cNvSpPr/>
+          <p:nvPr/>
+        </p:nvSpPr>
+        <p:spPr>
+          <a:xfrm>
+            <a:off x="5036945" y="765494"/>
+            <a:ext cx="838800" cy="838899"/>
+          </a:xfrm>
+          <a:prstGeom prst="ellipse">
+            <a:avLst/>
+          </a:prstGeom>
+          <a:solidFill>
+            <a:schemeClr val="dk1"/>
+          </a:solidFill>
+          <a:ln>
+            <a:noFill/>
+          </a:ln>
+        </p:spPr>
+        <p:style>
+          <a:lnRef idx="0">
+            <a:scrgbClr r="0" g="0" b="0"/>
+          </a:lnRef>
+          <a:fillRef idx="0">
+            <a:scrgbClr r="0" g="0" b="0"/>
+          </a:fillRef>
+          <a:effectRef idx="0">
+            <a:scrgbClr r="0" g="0" b="0"/>
+          </a:effectRef>
+          <a:fontRef idx="minor">
+            <a:schemeClr val="lt1"/>
+          </a:fontRef>
+        </p:style>
+        <p:txBody>
+          <a:bodyPr rtlCol="0" anchor="ctr"/>
+          <a:lstStyle/>
+          <a:p>
+            <a:pPr algn="ctr"/>
+            <a:endParaRPr lang="en-GB" dirty="0"/>
+          </a:p>
+        </p:txBody>
+      </p:sp>
+      <p:cxnSp>
+        <p:nvCxnSpPr>
+          <p:cNvPr id="29" name="Connector: Elbow 28">
+            <a:extLst>
+              <a:ext uri="{FF2B5EF4-FFF2-40B4-BE49-F238E27FC236}">
+                <a16:creationId xmlns:a16="http://schemas.microsoft.com/office/drawing/2014/main" id="{FCE90231-188F-4BCF-82B1-19008D47CD26}"/>
+              </a:ext>
+            </a:extLst>
+          </p:cNvPr>
+          <p:cNvCxnSpPr>
+            <a:stCxn id="22" idx="0"/>
+            <a:endCxn id="27" idx="2"/>
+          </p:cNvCxnSpPr>
+          <p:nvPr/>
+        </p:nvCxnSpPr>
+        <p:spPr>
+          <a:xfrm rot="5400000" flipH="1" flipV="1">
+            <a:off x="3752517" y="1305673"/>
+            <a:ext cx="1405157" cy="1163700"/>
+          </a:xfrm>
+          <a:prstGeom prst="bentConnector2">
+            <a:avLst/>
+          </a:prstGeom>
+        </p:spPr>
+        <p:style>
+          <a:lnRef idx="1">
+            <a:schemeClr val="accent2"/>
+          </a:lnRef>
+          <a:fillRef idx="0">
+            <a:schemeClr val="accent2"/>
+          </a:fillRef>
+          <a:effectRef idx="0">
+            <a:schemeClr val="accent2"/>
+          </a:effectRef>
+          <a:fontRef idx="minor">
+            <a:schemeClr val="tx1"/>
+          </a:fontRef>
+        </p:style>
+      </p:cxnSp>
+      <p:sp>
+        <p:nvSpPr>
+          <p:cNvPr id="30" name="Rectangle: Diagonal Corners Rounded 29">
+            <a:extLst>
+              <a:ext uri="{FF2B5EF4-FFF2-40B4-BE49-F238E27FC236}">
+                <a16:creationId xmlns:a16="http://schemas.microsoft.com/office/drawing/2014/main" id="{FF16552C-7A3B-448C-8D90-77601C327492}"/>
+              </a:ext>
+            </a:extLst>
+          </p:cNvPr>
+          <p:cNvSpPr/>
+          <p:nvPr/>
+        </p:nvSpPr>
+        <p:spPr>
+          <a:xfrm>
+            <a:off x="6467922" y="874555"/>
+            <a:ext cx="1098947" cy="620778"/>
+          </a:xfrm>
+          <a:prstGeom prst="round2DiagRect">
+            <a:avLst/>
+          </a:prstGeom>
+          <a:solidFill>
+            <a:schemeClr val="dk1"/>
+          </a:solidFill>
+          <a:ln>
+            <a:noFill/>
+          </a:ln>
+        </p:spPr>
+        <p:style>
+          <a:lnRef idx="0">
+            <a:scrgbClr r="0" g="0" b="0"/>
+          </a:lnRef>
+          <a:fillRef idx="0">
+            <a:scrgbClr r="0" g="0" b="0"/>
+          </a:fillRef>
+          <a:effectRef idx="0">
+            <a:scrgbClr r="0" g="0" b="0"/>
+          </a:effectRef>
+          <a:fontRef idx="minor">
+            <a:schemeClr val="lt1"/>
+          </a:fontRef>
+        </p:style>
+        <p:txBody>
+          <a:bodyPr rtlCol="0" anchor="ctr"/>
+          <a:lstStyle/>
+          <a:p>
+            <a:pPr algn="ctr"/>
+            <a:r>
+              <a:rPr lang="en-GB" sz="1600" dirty="0"/>
+              <a:t>New feature</a:t>
+            </a:r>
+          </a:p>
+        </p:txBody>
+      </p:sp>
+      <p:cxnSp>
+        <p:nvCxnSpPr>
+          <p:cNvPr id="31" name="Straight Arrow Connector 30">
+            <a:extLst>
+              <a:ext uri="{FF2B5EF4-FFF2-40B4-BE49-F238E27FC236}">
+                <a16:creationId xmlns:a16="http://schemas.microsoft.com/office/drawing/2014/main" id="{BED2C5E5-B3C9-45EF-AE05-9211EC6A4693}"/>
+              </a:ext>
+            </a:extLst>
+          </p:cNvPr>
+          <p:cNvCxnSpPr>
+            <a:cxnSpLocks/>
+            <a:endCxn id="27" idx="6"/>
+          </p:cNvCxnSpPr>
+          <p:nvPr/>
+        </p:nvCxnSpPr>
+        <p:spPr>
+          <a:xfrm flipH="1">
+            <a:off x="5875745" y="1184944"/>
+            <a:ext cx="592180" cy="0"/>
+          </a:xfrm>
+          <a:prstGeom prst="straightConnector1">
+            <a:avLst/>
+          </a:prstGeom>
+          <a:ln>
+            <a:tailEnd type="triangle"/>
+          </a:ln>
+        </p:spPr>
+        <p:style>
+          <a:lnRef idx="1">
+            <a:schemeClr val="dk1"/>
+          </a:lnRef>
+          <a:fillRef idx="0">
+            <a:schemeClr val="dk1"/>
+          </a:fillRef>
+          <a:effectRef idx="0">
+            <a:schemeClr val="dk1"/>
+          </a:effectRef>
+          <a:fontRef idx="minor">
+            <a:schemeClr val="tx1"/>
+          </a:fontRef>
+        </p:style>
+      </p:cxnSp>
+    </p:spTree>
+    <p:extLst>
+      <p:ext uri="{BB962C8B-B14F-4D97-AF65-F5344CB8AC3E}">
+        <p14:creationId xmlns:p14="http://schemas.microsoft.com/office/powerpoint/2010/main" val="2834791890"/>
+      </p:ext>
+    </p:extLst>
+  </p:cSld>
+  <p:clrMapOvr>
+    <a:masterClrMapping/>
+  </p:clrMapOvr>
+  <mc:AlternateContent xmlns:mc="http://schemas.openxmlformats.org/markup-compatibility/2006" xmlns:p14="http://schemas.microsoft.com/office/powerpoint/2010/main">
+    <mc:Choice Requires="p14">
+      <p:transition spd="med" p14:dur="700">
+        <p:fade/>
+      </p:transition>
+    </mc:Choice>
+    <mc:Fallback xmlns="">
+      <p:transition spd="med">
+        <p:fade/>
+      </p:transition>
+    </mc:Fallback>
+  </mc:AlternateContent>
+</p:sld>
+</file>
+
+<file path=ppt/slides/slide31.xml><?xml version="1.0" encoding="utf-8"?>
+<p:sld xmlns:a="http://schemas.openxmlformats.org/drawingml/2006/main" xmlns:r="http://schemas.openxmlformats.org/officeDocument/2006/relationships" xmlns:p="http://schemas.openxmlformats.org/presentationml/2006/main">
+  <p:cSld>
+    <p:spTree>
+      <p:nvGrpSpPr>
+        <p:cNvPr id="1" name=""/>
+        <p:cNvGrpSpPr/>
+        <p:nvPr/>
+      </p:nvGrpSpPr>
+      <p:grpSpPr>
+        <a:xfrm>
+          <a:off x="0" y="0"/>
+          <a:ext cx="0" cy="0"/>
+          <a:chOff x="0" y="0"/>
+          <a:chExt cx="0" cy="0"/>
+        </a:xfrm>
+      </p:grpSpPr>
+      <p:sp>
+        <p:nvSpPr>
+          <p:cNvPr id="13" name="Rectangle: Rounded Corners 12">
+            <a:extLst>
+              <a:ext uri="{FF2B5EF4-FFF2-40B4-BE49-F238E27FC236}">
+                <a16:creationId xmlns:a16="http://schemas.microsoft.com/office/drawing/2014/main" id="{1E4A7F89-0EE4-44B2-BDAA-9CD575279057}"/>
+              </a:ext>
+            </a:extLst>
+          </p:cNvPr>
+          <p:cNvSpPr/>
+          <p:nvPr/>
+        </p:nvSpPr>
+        <p:spPr>
+          <a:xfrm>
+            <a:off x="1126445" y="4079146"/>
+            <a:ext cx="2807992" cy="1593907"/>
+          </a:xfrm>
+          <a:prstGeom prst="roundRect">
+            <a:avLst/>
+          </a:prstGeom>
+        </p:spPr>
+        <p:style>
+          <a:lnRef idx="1">
+            <a:schemeClr val="dk1"/>
+          </a:lnRef>
+          <a:fillRef idx="2">
+            <a:schemeClr val="dk1"/>
+          </a:fillRef>
+          <a:effectRef idx="1">
+            <a:schemeClr val="dk1"/>
+          </a:effectRef>
+          <a:fontRef idx="minor">
+            <a:schemeClr val="dk1"/>
+          </a:fontRef>
+        </p:style>
+        <p:txBody>
+          <a:bodyPr rtlCol="0" anchor="ctr"/>
+          <a:lstStyle/>
+          <a:p>
+            <a:pPr algn="ctr"/>
+            <a:r>
+              <a:rPr lang="en-GB" dirty="0"/>
+              <a:t>Another branch could then be created to fix a bug</a:t>
+            </a:r>
+          </a:p>
+        </p:txBody>
+      </p:sp>
+      <p:sp>
+        <p:nvSpPr>
+          <p:cNvPr id="16" name="Rectangle: Diagonal Corners Rounded 15">
+            <a:extLst>
+              <a:ext uri="{FF2B5EF4-FFF2-40B4-BE49-F238E27FC236}">
+                <a16:creationId xmlns:a16="http://schemas.microsoft.com/office/drawing/2014/main" id="{403839E0-4757-428F-9612-4480AD48D5B9}"/>
+              </a:ext>
+            </a:extLst>
+          </p:cNvPr>
+          <p:cNvSpPr/>
+          <p:nvPr/>
+        </p:nvSpPr>
+        <p:spPr>
+          <a:xfrm>
+            <a:off x="6561322" y="3842161"/>
+            <a:ext cx="947956" cy="620779"/>
+          </a:xfrm>
+          <a:prstGeom prst="round2DiagRect">
+            <a:avLst/>
+          </a:prstGeom>
+          <a:solidFill>
+            <a:schemeClr val="accent2">
+              <a:alpha val="50000"/>
+            </a:schemeClr>
+          </a:solidFill>
+          <a:ln>
+            <a:noFill/>
+          </a:ln>
+        </p:spPr>
+        <p:style>
+          <a:lnRef idx="0">
+            <a:scrgbClr r="0" g="0" b="0"/>
+          </a:lnRef>
+          <a:fillRef idx="0">
+            <a:scrgbClr r="0" g="0" b="0"/>
+          </a:fillRef>
+          <a:effectRef idx="0">
+            <a:scrgbClr r="0" g="0" b="0"/>
+          </a:effectRef>
+          <a:fontRef idx="minor">
+            <a:schemeClr val="lt1"/>
+          </a:fontRef>
+        </p:style>
+        <p:txBody>
+          <a:bodyPr rtlCol="0" anchor="ctr"/>
+          <a:lstStyle/>
+          <a:p>
+            <a:pPr algn="ctr"/>
+            <a:r>
+              <a:rPr lang="en-GB" sz="1600" dirty="0"/>
+              <a:t>Main branch</a:t>
+            </a:r>
+          </a:p>
+        </p:txBody>
+      </p:sp>
+      <p:cxnSp>
+        <p:nvCxnSpPr>
+          <p:cNvPr id="17" name="Straight Arrow Connector 16">
+            <a:extLst>
+              <a:ext uri="{FF2B5EF4-FFF2-40B4-BE49-F238E27FC236}">
+                <a16:creationId xmlns:a16="http://schemas.microsoft.com/office/drawing/2014/main" id="{74551AD8-0D37-4C85-8073-71EBC8B6A565}"/>
+              </a:ext>
+            </a:extLst>
+          </p:cNvPr>
+          <p:cNvCxnSpPr>
+            <a:cxnSpLocks/>
+            <a:stCxn id="16" idx="3"/>
+            <a:endCxn id="18" idx="4"/>
+          </p:cNvCxnSpPr>
+          <p:nvPr/>
+        </p:nvCxnSpPr>
+        <p:spPr>
+          <a:xfrm flipV="1">
+            <a:off x="7035300" y="3429000"/>
+            <a:ext cx="0" cy="413161"/>
+          </a:xfrm>
+          <a:prstGeom prst="straightConnector1">
+            <a:avLst/>
+          </a:prstGeom>
+          <a:ln>
+            <a:tailEnd type="triangle"/>
+          </a:ln>
+        </p:spPr>
+        <p:style>
+          <a:lnRef idx="1">
+            <a:schemeClr val="dk1"/>
+          </a:lnRef>
+          <a:fillRef idx="0">
+            <a:schemeClr val="dk1"/>
+          </a:fillRef>
+          <a:effectRef idx="0">
+            <a:schemeClr val="dk1"/>
+          </a:effectRef>
+          <a:fontRef idx="minor">
+            <a:schemeClr val="tx1"/>
+          </a:fontRef>
+        </p:style>
+      </p:cxnSp>
+      <p:grpSp>
+        <p:nvGrpSpPr>
+          <p:cNvPr id="19" name="Group 18">
+            <a:extLst>
+              <a:ext uri="{FF2B5EF4-FFF2-40B4-BE49-F238E27FC236}">
+                <a16:creationId xmlns:a16="http://schemas.microsoft.com/office/drawing/2014/main" id="{269D3782-5F2D-4846-A561-56DCEF504C72}"/>
+              </a:ext>
+            </a:extLst>
+          </p:cNvPr>
+          <p:cNvGrpSpPr/>
+          <p:nvPr/>
+        </p:nvGrpSpPr>
+        <p:grpSpPr>
+          <a:xfrm>
+            <a:off x="287645" y="2590101"/>
+            <a:ext cx="4005000" cy="838899"/>
+            <a:chOff x="1610686" y="2427215"/>
+            <a:chExt cx="4005000" cy="838899"/>
+          </a:xfrm>
+        </p:grpSpPr>
+        <p:sp>
+          <p:nvSpPr>
+            <p:cNvPr id="20" name="Oval 19">
+              <a:extLst>
+                <a:ext uri="{FF2B5EF4-FFF2-40B4-BE49-F238E27FC236}">
+                  <a16:creationId xmlns:a16="http://schemas.microsoft.com/office/drawing/2014/main" id="{3B5A2C4A-CA16-44A7-A144-D182126ABD50}"/>
+                </a:ext>
+              </a:extLst>
+            </p:cNvPr>
+            <p:cNvSpPr/>
+            <p:nvPr/>
+          </p:nvSpPr>
+          <p:spPr>
+            <a:xfrm>
+              <a:off x="1610686" y="2427215"/>
+              <a:ext cx="838800" cy="838899"/>
+            </a:xfrm>
+            <a:prstGeom prst="ellipse">
+              <a:avLst/>
+            </a:prstGeom>
+            <a:solidFill>
+              <a:schemeClr val="accent2">
+                <a:alpha val="50000"/>
+              </a:schemeClr>
+            </a:solidFill>
+            <a:ln>
+              <a:noFill/>
+            </a:ln>
+          </p:spPr>
+          <p:style>
+            <a:lnRef idx="0">
+              <a:scrgbClr r="0" g="0" b="0"/>
+            </a:lnRef>
+            <a:fillRef idx="0">
+              <a:scrgbClr r="0" g="0" b="0"/>
+            </a:fillRef>
+            <a:effectRef idx="0">
+              <a:scrgbClr r="0" g="0" b="0"/>
+            </a:effectRef>
+            <a:fontRef idx="minor">
+              <a:schemeClr val="lt1"/>
+            </a:fontRef>
+          </p:style>
+          <p:txBody>
+            <a:bodyPr rtlCol="0" anchor="ctr"/>
+            <a:lstStyle/>
+            <a:p>
+              <a:pPr algn="ctr"/>
+              <a:endParaRPr lang="en-GB" dirty="0"/>
+            </a:p>
+          </p:txBody>
+        </p:sp>
+        <p:sp>
+          <p:nvSpPr>
+            <p:cNvPr id="21" name="Oval 20">
+              <a:extLst>
+                <a:ext uri="{FF2B5EF4-FFF2-40B4-BE49-F238E27FC236}">
+                  <a16:creationId xmlns:a16="http://schemas.microsoft.com/office/drawing/2014/main" id="{A2E235D1-3D5B-48E3-B005-235179F6D922}"/>
+                </a:ext>
+              </a:extLst>
+            </p:cNvPr>
+            <p:cNvSpPr/>
+            <p:nvPr/>
+          </p:nvSpPr>
+          <p:spPr>
+            <a:xfrm>
+              <a:off x="3193786" y="2427215"/>
+              <a:ext cx="838800" cy="838899"/>
+            </a:xfrm>
+            <a:prstGeom prst="ellipse">
+              <a:avLst/>
+            </a:prstGeom>
+            <a:solidFill>
+              <a:schemeClr val="accent2">
+                <a:alpha val="50000"/>
+              </a:schemeClr>
+            </a:solidFill>
+            <a:ln>
+              <a:noFill/>
+            </a:ln>
+          </p:spPr>
+          <p:style>
+            <a:lnRef idx="0">
+              <a:scrgbClr r="0" g="0" b="0"/>
+            </a:lnRef>
+            <a:fillRef idx="0">
+              <a:scrgbClr r="0" g="0" b="0"/>
+            </a:fillRef>
+            <a:effectRef idx="0">
+              <a:scrgbClr r="0" g="0" b="0"/>
+            </a:effectRef>
+            <a:fontRef idx="minor">
+              <a:schemeClr val="lt1"/>
+            </a:fontRef>
+          </p:style>
+          <p:txBody>
+            <a:bodyPr rtlCol="0" anchor="ctr"/>
+            <a:lstStyle/>
+            <a:p>
+              <a:pPr algn="ctr"/>
+              <a:endParaRPr lang="en-GB" dirty="0"/>
+            </a:p>
+          </p:txBody>
+        </p:sp>
+        <p:sp>
+          <p:nvSpPr>
+            <p:cNvPr id="22" name="Oval 21">
+              <a:extLst>
+                <a:ext uri="{FF2B5EF4-FFF2-40B4-BE49-F238E27FC236}">
+                  <a16:creationId xmlns:a16="http://schemas.microsoft.com/office/drawing/2014/main" id="{E2D2754B-CC1E-4EB9-874D-8AFB0F5B25EB}"/>
+                </a:ext>
+              </a:extLst>
+            </p:cNvPr>
+            <p:cNvSpPr/>
+            <p:nvPr/>
+          </p:nvSpPr>
+          <p:spPr>
+            <a:xfrm>
+              <a:off x="4776886" y="2427215"/>
+              <a:ext cx="838800" cy="838899"/>
+            </a:xfrm>
+            <a:prstGeom prst="ellipse">
+              <a:avLst/>
+            </a:prstGeom>
+            <a:solidFill>
+              <a:schemeClr val="accent2">
+                <a:alpha val="50000"/>
+              </a:schemeClr>
+            </a:solidFill>
+            <a:ln>
+              <a:noFill/>
+            </a:ln>
+          </p:spPr>
+          <p:style>
+            <a:lnRef idx="0">
+              <a:scrgbClr r="0" g="0" b="0"/>
+            </a:lnRef>
+            <a:fillRef idx="0">
+              <a:scrgbClr r="0" g="0" b="0"/>
+            </a:fillRef>
+            <a:effectRef idx="0">
+              <a:scrgbClr r="0" g="0" b="0"/>
+            </a:effectRef>
+            <a:fontRef idx="minor">
+              <a:schemeClr val="lt1"/>
+            </a:fontRef>
+          </p:style>
+          <p:txBody>
+            <a:bodyPr rtlCol="0" anchor="ctr"/>
+            <a:lstStyle/>
+            <a:p>
+              <a:pPr algn="ctr"/>
+              <a:endParaRPr lang="en-GB" dirty="0"/>
+            </a:p>
+          </p:txBody>
+        </p:sp>
+        <p:cxnSp>
+          <p:nvCxnSpPr>
+            <p:cNvPr id="23" name="Straight Connector 22">
+              <a:extLst>
+                <a:ext uri="{FF2B5EF4-FFF2-40B4-BE49-F238E27FC236}">
+                  <a16:creationId xmlns:a16="http://schemas.microsoft.com/office/drawing/2014/main" id="{D05DA3C7-4173-462B-BA15-9FCD562D1955}"/>
+                </a:ext>
+              </a:extLst>
+            </p:cNvPr>
+            <p:cNvCxnSpPr>
+              <a:cxnSpLocks/>
+              <a:stCxn id="20" idx="6"/>
+            </p:cNvCxnSpPr>
+            <p:nvPr/>
+          </p:nvCxnSpPr>
+          <p:spPr>
+            <a:xfrm>
+              <a:off x="2449486" y="2846665"/>
+              <a:ext cx="744300" cy="0"/>
+            </a:xfrm>
+            <a:prstGeom prst="line">
+              <a:avLst/>
+            </a:prstGeom>
+          </p:spPr>
+          <p:style>
+            <a:lnRef idx="1">
+              <a:schemeClr val="accent2"/>
+            </a:lnRef>
+            <a:fillRef idx="0">
+              <a:schemeClr val="accent2"/>
+            </a:fillRef>
+            <a:effectRef idx="0">
+              <a:schemeClr val="accent2"/>
+            </a:effectRef>
+            <a:fontRef idx="minor">
+              <a:schemeClr val="tx1"/>
+            </a:fontRef>
+          </p:style>
+        </p:cxnSp>
+        <p:cxnSp>
+          <p:nvCxnSpPr>
+            <p:cNvPr id="24" name="Straight Connector 23">
+              <a:extLst>
+                <a:ext uri="{FF2B5EF4-FFF2-40B4-BE49-F238E27FC236}">
+                  <a16:creationId xmlns:a16="http://schemas.microsoft.com/office/drawing/2014/main" id="{F5A6D9EC-7A99-46E2-B3D5-219CACE97D2D}"/>
+                </a:ext>
+              </a:extLst>
+            </p:cNvPr>
+            <p:cNvCxnSpPr>
+              <a:cxnSpLocks/>
+              <a:stCxn id="21" idx="6"/>
+              <a:endCxn id="22" idx="2"/>
+            </p:cNvCxnSpPr>
+            <p:nvPr/>
+          </p:nvCxnSpPr>
+          <p:spPr>
+            <a:xfrm>
+              <a:off x="4032586" y="2846665"/>
+              <a:ext cx="744300" cy="0"/>
+            </a:xfrm>
+            <a:prstGeom prst="line">
+              <a:avLst/>
+            </a:prstGeom>
+          </p:spPr>
+          <p:style>
+            <a:lnRef idx="1">
+              <a:schemeClr val="accent2"/>
+            </a:lnRef>
+            <a:fillRef idx="0">
+              <a:schemeClr val="accent2"/>
+            </a:fillRef>
+            <a:effectRef idx="0">
+              <a:schemeClr val="accent2"/>
+            </a:effectRef>
+            <a:fontRef idx="minor">
+              <a:schemeClr val="tx1"/>
+            </a:fontRef>
+          </p:style>
+        </p:cxnSp>
+      </p:grpSp>
+      <p:sp>
+        <p:nvSpPr>
+          <p:cNvPr id="25" name="Oval 24">
+            <a:extLst>
+              <a:ext uri="{FF2B5EF4-FFF2-40B4-BE49-F238E27FC236}">
+                <a16:creationId xmlns:a16="http://schemas.microsoft.com/office/drawing/2014/main" id="{69EDCD39-0CE5-4FA4-BE32-64EF92AA7AFE}"/>
+              </a:ext>
+            </a:extLst>
+          </p:cNvPr>
+          <p:cNvSpPr/>
+          <p:nvPr/>
+        </p:nvSpPr>
+        <p:spPr>
+          <a:xfrm>
+            <a:off x="5036945" y="2590101"/>
+            <a:ext cx="838800" cy="838899"/>
+          </a:xfrm>
+          <a:prstGeom prst="ellipse">
+            <a:avLst/>
+          </a:prstGeom>
+          <a:solidFill>
+            <a:schemeClr val="accent2">
+              <a:alpha val="50000"/>
+            </a:schemeClr>
+          </a:solidFill>
+          <a:ln>
+            <a:noFill/>
+          </a:ln>
+        </p:spPr>
+        <p:style>
+          <a:lnRef idx="0">
+            <a:scrgbClr r="0" g="0" b="0"/>
+          </a:lnRef>
+          <a:fillRef idx="0">
+            <a:scrgbClr r="0" g="0" b="0"/>
+          </a:fillRef>
+          <a:effectRef idx="0">
+            <a:scrgbClr r="0" g="0" b="0"/>
+          </a:effectRef>
+          <a:fontRef idx="minor">
+            <a:schemeClr val="lt1"/>
+          </a:fontRef>
+        </p:style>
+        <p:txBody>
+          <a:bodyPr rtlCol="0" anchor="ctr"/>
+          <a:lstStyle/>
+          <a:p>
+            <a:pPr algn="ctr"/>
+            <a:endParaRPr lang="en-GB" dirty="0"/>
+          </a:p>
+        </p:txBody>
+      </p:sp>
+      <p:cxnSp>
+        <p:nvCxnSpPr>
+          <p:cNvPr id="26" name="Straight Connector 25">
+            <a:extLst>
+              <a:ext uri="{FF2B5EF4-FFF2-40B4-BE49-F238E27FC236}">
+                <a16:creationId xmlns:a16="http://schemas.microsoft.com/office/drawing/2014/main" id="{C99A3B61-0D07-4843-AE02-F8F520A1AC3F}"/>
+              </a:ext>
+            </a:extLst>
+          </p:cNvPr>
+          <p:cNvCxnSpPr>
+            <a:cxnSpLocks/>
+            <a:endCxn id="25" idx="2"/>
+          </p:cNvCxnSpPr>
+          <p:nvPr/>
+        </p:nvCxnSpPr>
+        <p:spPr>
+          <a:xfrm>
+            <a:off x="4292645" y="3009551"/>
+            <a:ext cx="744300" cy="0"/>
+          </a:xfrm>
+          <a:prstGeom prst="line">
+            <a:avLst/>
+          </a:prstGeom>
+        </p:spPr>
+        <p:style>
+          <a:lnRef idx="1">
+            <a:schemeClr val="accent2"/>
+          </a:lnRef>
+          <a:fillRef idx="0">
+            <a:schemeClr val="accent2"/>
+          </a:fillRef>
+          <a:effectRef idx="0">
+            <a:schemeClr val="accent2"/>
+          </a:effectRef>
+          <a:fontRef idx="minor">
+            <a:schemeClr val="tx1"/>
+          </a:fontRef>
+        </p:style>
+      </p:cxnSp>
+      <p:sp>
+        <p:nvSpPr>
+          <p:cNvPr id="27" name="Oval 26">
+            <a:extLst>
+              <a:ext uri="{FF2B5EF4-FFF2-40B4-BE49-F238E27FC236}">
+                <a16:creationId xmlns:a16="http://schemas.microsoft.com/office/drawing/2014/main" id="{1F097433-53E8-4B8F-BAC2-79268AFEFD6E}"/>
+              </a:ext>
+            </a:extLst>
+          </p:cNvPr>
+          <p:cNvSpPr/>
+          <p:nvPr/>
+        </p:nvSpPr>
+        <p:spPr>
+          <a:xfrm>
+            <a:off x="5036945" y="765494"/>
+            <a:ext cx="838800" cy="838899"/>
+          </a:xfrm>
+          <a:prstGeom prst="ellipse">
+            <a:avLst/>
+          </a:prstGeom>
+          <a:solidFill>
+            <a:schemeClr val="dk1"/>
+          </a:solidFill>
+          <a:ln>
+            <a:noFill/>
+          </a:ln>
+        </p:spPr>
+        <p:style>
+          <a:lnRef idx="0">
+            <a:scrgbClr r="0" g="0" b="0"/>
+          </a:lnRef>
+          <a:fillRef idx="0">
+            <a:scrgbClr r="0" g="0" b="0"/>
+          </a:fillRef>
+          <a:effectRef idx="0">
+            <a:scrgbClr r="0" g="0" b="0"/>
+          </a:effectRef>
+          <a:fontRef idx="minor">
+            <a:schemeClr val="lt1"/>
+          </a:fontRef>
+        </p:style>
+        <p:txBody>
+          <a:bodyPr rtlCol="0" anchor="ctr"/>
+          <a:lstStyle/>
+          <a:p>
+            <a:pPr algn="ctr"/>
+            <a:endParaRPr lang="en-GB" dirty="0"/>
+          </a:p>
+        </p:txBody>
+      </p:sp>
+      <p:cxnSp>
+        <p:nvCxnSpPr>
+          <p:cNvPr id="29" name="Connector: Elbow 28">
+            <a:extLst>
+              <a:ext uri="{FF2B5EF4-FFF2-40B4-BE49-F238E27FC236}">
+                <a16:creationId xmlns:a16="http://schemas.microsoft.com/office/drawing/2014/main" id="{FCE90231-188F-4BCF-82B1-19008D47CD26}"/>
+              </a:ext>
+            </a:extLst>
+          </p:cNvPr>
+          <p:cNvCxnSpPr>
+            <a:stCxn id="22" idx="0"/>
+            <a:endCxn id="27" idx="2"/>
+          </p:cNvCxnSpPr>
+          <p:nvPr/>
+        </p:nvCxnSpPr>
+        <p:spPr>
+          <a:xfrm rot="5400000" flipH="1" flipV="1">
+            <a:off x="3752517" y="1305673"/>
+            <a:ext cx="1405157" cy="1163700"/>
+          </a:xfrm>
+          <a:prstGeom prst="bentConnector2">
+            <a:avLst/>
+          </a:prstGeom>
+        </p:spPr>
+        <p:style>
+          <a:lnRef idx="1">
+            <a:schemeClr val="accent2"/>
+          </a:lnRef>
+          <a:fillRef idx="0">
+            <a:schemeClr val="accent2"/>
+          </a:fillRef>
+          <a:effectRef idx="0">
+            <a:schemeClr val="accent2"/>
+          </a:effectRef>
+          <a:fontRef idx="minor">
+            <a:schemeClr val="tx1"/>
+          </a:fontRef>
+        </p:style>
+      </p:cxnSp>
+      <p:sp>
+        <p:nvSpPr>
+          <p:cNvPr id="18" name="Oval 17">
+            <a:extLst>
+              <a:ext uri="{FF2B5EF4-FFF2-40B4-BE49-F238E27FC236}">
+                <a16:creationId xmlns:a16="http://schemas.microsoft.com/office/drawing/2014/main" id="{C5CCCA15-17FB-4AAA-B730-F2B5D870F1C5}"/>
+              </a:ext>
+            </a:extLst>
+          </p:cNvPr>
+          <p:cNvSpPr/>
+          <p:nvPr/>
+        </p:nvSpPr>
+        <p:spPr>
+          <a:xfrm>
+            <a:off x="6615900" y="2590101"/>
+            <a:ext cx="838800" cy="838899"/>
+          </a:xfrm>
+          <a:prstGeom prst="ellipse">
+            <a:avLst/>
+          </a:prstGeom>
+          <a:solidFill>
+            <a:schemeClr val="accent2">
+              <a:alpha val="50000"/>
+            </a:schemeClr>
+          </a:solidFill>
+          <a:ln>
+            <a:noFill/>
+          </a:ln>
+        </p:spPr>
+        <p:style>
+          <a:lnRef idx="0">
+            <a:scrgbClr r="0" g="0" b="0"/>
+          </a:lnRef>
+          <a:fillRef idx="0">
+            <a:scrgbClr r="0" g="0" b="0"/>
+          </a:fillRef>
+          <a:effectRef idx="0">
+            <a:scrgbClr r="0" g="0" b="0"/>
+          </a:effectRef>
+          <a:fontRef idx="minor">
+            <a:schemeClr val="lt1"/>
+          </a:fontRef>
+        </p:style>
+        <p:txBody>
+          <a:bodyPr rtlCol="0" anchor="ctr"/>
+          <a:lstStyle/>
+          <a:p>
+            <a:pPr algn="ctr"/>
+            <a:endParaRPr lang="en-GB" dirty="0"/>
+          </a:p>
+        </p:txBody>
+      </p:sp>
+      <p:cxnSp>
+        <p:nvCxnSpPr>
+          <p:cNvPr id="28" name="Straight Connector 27">
+            <a:extLst>
+              <a:ext uri="{FF2B5EF4-FFF2-40B4-BE49-F238E27FC236}">
+                <a16:creationId xmlns:a16="http://schemas.microsoft.com/office/drawing/2014/main" id="{DCBAE851-9DE4-4CF7-8636-06004D086804}"/>
+              </a:ext>
+            </a:extLst>
+          </p:cNvPr>
+          <p:cNvCxnSpPr>
+            <a:cxnSpLocks/>
+            <a:endCxn id="18" idx="2"/>
+          </p:cNvCxnSpPr>
+          <p:nvPr/>
+        </p:nvCxnSpPr>
+        <p:spPr>
+          <a:xfrm>
+            <a:off x="5871600" y="3009551"/>
+            <a:ext cx="744300" cy="0"/>
+          </a:xfrm>
+          <a:prstGeom prst="line">
+            <a:avLst/>
+          </a:prstGeom>
+        </p:spPr>
+        <p:style>
+          <a:lnRef idx="1">
+            <a:schemeClr val="accent2"/>
+          </a:lnRef>
+          <a:fillRef idx="0">
+            <a:schemeClr val="accent2"/>
+          </a:fillRef>
+          <a:effectRef idx="0">
+            <a:schemeClr val="accent2"/>
+          </a:effectRef>
+          <a:fontRef idx="minor">
+            <a:schemeClr val="tx1"/>
+          </a:fontRef>
+        </p:style>
+      </p:cxnSp>
+      <p:sp>
+        <p:nvSpPr>
+          <p:cNvPr id="32" name="Oval 31">
+            <a:extLst>
+              <a:ext uri="{FF2B5EF4-FFF2-40B4-BE49-F238E27FC236}">
+                <a16:creationId xmlns:a16="http://schemas.microsoft.com/office/drawing/2014/main" id="{EA12E314-7309-412E-AAFB-1B223829F5AF}"/>
+              </a:ext>
+            </a:extLst>
+          </p:cNvPr>
+          <p:cNvSpPr/>
+          <p:nvPr/>
+        </p:nvSpPr>
+        <p:spPr>
+          <a:xfrm>
+            <a:off x="6620045" y="765494"/>
+            <a:ext cx="838800" cy="838899"/>
+          </a:xfrm>
+          <a:prstGeom prst="ellipse">
+            <a:avLst/>
+          </a:prstGeom>
+          <a:solidFill>
+            <a:schemeClr val="dk1"/>
+          </a:solidFill>
+          <a:ln>
+            <a:noFill/>
+          </a:ln>
+        </p:spPr>
+        <p:style>
+          <a:lnRef idx="0">
+            <a:scrgbClr r="0" g="0" b="0"/>
+          </a:lnRef>
+          <a:fillRef idx="0">
+            <a:scrgbClr r="0" g="0" b="0"/>
+          </a:fillRef>
+          <a:effectRef idx="0">
+            <a:scrgbClr r="0" g="0" b="0"/>
+          </a:effectRef>
+          <a:fontRef idx="minor">
+            <a:schemeClr val="lt1"/>
+          </a:fontRef>
+        </p:style>
+        <p:txBody>
+          <a:bodyPr rtlCol="0" anchor="ctr"/>
+          <a:lstStyle/>
+          <a:p>
+            <a:pPr algn="ctr"/>
+            <a:endParaRPr lang="en-GB" dirty="0"/>
+          </a:p>
+        </p:txBody>
+      </p:sp>
+      <p:sp>
+        <p:nvSpPr>
+          <p:cNvPr id="33" name="Rectangle: Diagonal Corners Rounded 32">
+            <a:extLst>
+              <a:ext uri="{FF2B5EF4-FFF2-40B4-BE49-F238E27FC236}">
+                <a16:creationId xmlns:a16="http://schemas.microsoft.com/office/drawing/2014/main" id="{5DD6C2D3-E837-409A-ADAF-1370ADC582AC}"/>
+              </a:ext>
+            </a:extLst>
+          </p:cNvPr>
+          <p:cNvSpPr/>
+          <p:nvPr/>
+        </p:nvSpPr>
+        <p:spPr>
+          <a:xfrm>
+            <a:off x="8051022" y="874555"/>
+            <a:ext cx="1098947" cy="620778"/>
+          </a:xfrm>
+          <a:prstGeom prst="round2DiagRect">
+            <a:avLst/>
+          </a:prstGeom>
+          <a:solidFill>
+            <a:schemeClr val="dk1"/>
+          </a:solidFill>
+          <a:ln>
+            <a:noFill/>
+          </a:ln>
+        </p:spPr>
+        <p:style>
+          <a:lnRef idx="0">
+            <a:scrgbClr r="0" g="0" b="0"/>
+          </a:lnRef>
+          <a:fillRef idx="0">
+            <a:scrgbClr r="0" g="0" b="0"/>
+          </a:fillRef>
+          <a:effectRef idx="0">
+            <a:scrgbClr r="0" g="0" b="0"/>
+          </a:effectRef>
+          <a:fontRef idx="minor">
+            <a:schemeClr val="lt1"/>
+          </a:fontRef>
+        </p:style>
+        <p:txBody>
+          <a:bodyPr rtlCol="0" anchor="ctr"/>
+          <a:lstStyle/>
+          <a:p>
+            <a:pPr algn="ctr"/>
+            <a:r>
+              <a:rPr lang="en-GB" sz="1600" dirty="0"/>
+              <a:t>New feature</a:t>
+            </a:r>
+          </a:p>
+        </p:txBody>
+      </p:sp>
+      <p:cxnSp>
+        <p:nvCxnSpPr>
+          <p:cNvPr id="34" name="Straight Arrow Connector 33">
+            <a:extLst>
+              <a:ext uri="{FF2B5EF4-FFF2-40B4-BE49-F238E27FC236}">
+                <a16:creationId xmlns:a16="http://schemas.microsoft.com/office/drawing/2014/main" id="{9B5DD4D7-B7BE-4318-9D31-1D8DB73C1C79}"/>
+              </a:ext>
+            </a:extLst>
+          </p:cNvPr>
+          <p:cNvCxnSpPr>
+            <a:cxnSpLocks/>
+            <a:endCxn id="32" idx="6"/>
+          </p:cNvCxnSpPr>
+          <p:nvPr/>
+        </p:nvCxnSpPr>
+        <p:spPr>
+          <a:xfrm flipH="1">
+            <a:off x="7458845" y="1184944"/>
+            <a:ext cx="592180" cy="0"/>
+          </a:xfrm>
+          <a:prstGeom prst="straightConnector1">
+            <a:avLst/>
+          </a:prstGeom>
+          <a:ln>
+            <a:tailEnd type="triangle"/>
+          </a:ln>
+        </p:spPr>
+        <p:style>
+          <a:lnRef idx="1">
+            <a:schemeClr val="dk1"/>
+          </a:lnRef>
+          <a:fillRef idx="0">
+            <a:schemeClr val="dk1"/>
+          </a:fillRef>
+          <a:effectRef idx="0">
+            <a:schemeClr val="dk1"/>
+          </a:effectRef>
+          <a:fontRef idx="minor">
+            <a:schemeClr val="tx1"/>
+          </a:fontRef>
+        </p:style>
+      </p:cxnSp>
+      <p:cxnSp>
+        <p:nvCxnSpPr>
+          <p:cNvPr id="35" name="Straight Connector 34">
+            <a:extLst>
+              <a:ext uri="{FF2B5EF4-FFF2-40B4-BE49-F238E27FC236}">
+                <a16:creationId xmlns:a16="http://schemas.microsoft.com/office/drawing/2014/main" id="{08B551E1-ABD6-4D1B-BA23-0F524DFB4AE4}"/>
+              </a:ext>
+            </a:extLst>
+          </p:cNvPr>
+          <p:cNvCxnSpPr>
+            <a:cxnSpLocks/>
+          </p:cNvCxnSpPr>
+          <p:nvPr/>
+        </p:nvCxnSpPr>
+        <p:spPr>
+          <a:xfrm>
+            <a:off x="5875745" y="1184944"/>
+            <a:ext cx="744300" cy="0"/>
+          </a:xfrm>
+          <a:prstGeom prst="line">
+            <a:avLst/>
+          </a:prstGeom>
+        </p:spPr>
+        <p:style>
+          <a:lnRef idx="1">
+            <a:schemeClr val="accent2"/>
+          </a:lnRef>
+          <a:fillRef idx="0">
+            <a:schemeClr val="accent2"/>
+          </a:fillRef>
+          <a:effectRef idx="0">
+            <a:schemeClr val="accent2"/>
+          </a:effectRef>
+          <a:fontRef idx="minor">
+            <a:schemeClr val="tx1"/>
+          </a:fontRef>
+        </p:style>
+      </p:cxnSp>
+      <p:sp>
+        <p:nvSpPr>
+          <p:cNvPr id="36" name="Oval 35">
+            <a:extLst>
+              <a:ext uri="{FF2B5EF4-FFF2-40B4-BE49-F238E27FC236}">
+                <a16:creationId xmlns:a16="http://schemas.microsoft.com/office/drawing/2014/main" id="{8B30E8C0-47B5-438A-9179-5A351B2D42D4}"/>
+              </a:ext>
+            </a:extLst>
+          </p:cNvPr>
+          <p:cNvSpPr/>
+          <p:nvPr/>
+        </p:nvSpPr>
+        <p:spPr>
+          <a:xfrm>
+            <a:off x="6615900" y="4876099"/>
+            <a:ext cx="838800" cy="838899"/>
+          </a:xfrm>
+          <a:prstGeom prst="ellipse">
+            <a:avLst/>
+          </a:prstGeom>
+          <a:solidFill>
+            <a:schemeClr val="accent1">
+              <a:alpha val="50000"/>
+            </a:schemeClr>
+          </a:solidFill>
+          <a:ln>
+            <a:noFill/>
+          </a:ln>
+        </p:spPr>
+        <p:style>
+          <a:lnRef idx="0">
+            <a:scrgbClr r="0" g="0" b="0"/>
+          </a:lnRef>
+          <a:fillRef idx="0">
+            <a:scrgbClr r="0" g="0" b="0"/>
+          </a:fillRef>
+          <a:effectRef idx="0">
+            <a:scrgbClr r="0" g="0" b="0"/>
+          </a:effectRef>
+          <a:fontRef idx="minor">
+            <a:schemeClr val="lt1"/>
+          </a:fontRef>
+        </p:style>
+        <p:txBody>
+          <a:bodyPr rtlCol="0" anchor="ctr"/>
+          <a:lstStyle/>
+          <a:p>
+            <a:pPr algn="ctr"/>
+            <a:endParaRPr lang="en-GB" dirty="0"/>
+          </a:p>
+        </p:txBody>
+      </p:sp>
+      <p:cxnSp>
+        <p:nvCxnSpPr>
+          <p:cNvPr id="6" name="Connector: Elbow 5">
+            <a:extLst>
+              <a:ext uri="{FF2B5EF4-FFF2-40B4-BE49-F238E27FC236}">
+                <a16:creationId xmlns:a16="http://schemas.microsoft.com/office/drawing/2014/main" id="{5796D08A-8EAF-4D9E-AC59-6516A5D78A32}"/>
+              </a:ext>
+            </a:extLst>
+          </p:cNvPr>
+          <p:cNvCxnSpPr>
+            <a:stCxn id="25" idx="4"/>
+            <a:endCxn id="36" idx="2"/>
+          </p:cNvCxnSpPr>
+          <p:nvPr/>
+        </p:nvCxnSpPr>
+        <p:spPr>
+          <a:xfrm rot="16200000" flipH="1">
+            <a:off x="5102848" y="3782496"/>
+            <a:ext cx="1866549" cy="1159555"/>
+          </a:xfrm>
+          <a:prstGeom prst="bentConnector2">
+            <a:avLst/>
+          </a:prstGeom>
+        </p:spPr>
+        <p:style>
+          <a:lnRef idx="1">
+            <a:schemeClr val="accent1"/>
+          </a:lnRef>
+          <a:fillRef idx="0">
+            <a:schemeClr val="accent1"/>
+          </a:fillRef>
+          <a:effectRef idx="0">
+            <a:schemeClr val="accent1"/>
+          </a:effectRef>
+          <a:fontRef idx="minor">
+            <a:schemeClr val="tx1"/>
+          </a:fontRef>
+        </p:style>
+      </p:cxnSp>
+      <p:sp>
+        <p:nvSpPr>
+          <p:cNvPr id="37" name="Rectangle: Diagonal Corners Rounded 36">
+            <a:extLst>
+              <a:ext uri="{FF2B5EF4-FFF2-40B4-BE49-F238E27FC236}">
+                <a16:creationId xmlns:a16="http://schemas.microsoft.com/office/drawing/2014/main" id="{A9141DE7-B69E-46F4-A1C9-F2F7E71787A7}"/>
+              </a:ext>
+            </a:extLst>
+          </p:cNvPr>
+          <p:cNvSpPr/>
+          <p:nvPr/>
+        </p:nvSpPr>
+        <p:spPr>
+          <a:xfrm>
+            <a:off x="8198416" y="4985159"/>
+            <a:ext cx="1098947" cy="620778"/>
+          </a:xfrm>
+          <a:prstGeom prst="round2DiagRect">
+            <a:avLst/>
+          </a:prstGeom>
+          <a:solidFill>
+            <a:schemeClr val="accent1">
+              <a:alpha val="50000"/>
+            </a:schemeClr>
+          </a:solidFill>
+          <a:ln>
+            <a:noFill/>
+          </a:ln>
+        </p:spPr>
+        <p:style>
+          <a:lnRef idx="0">
+            <a:scrgbClr r="0" g="0" b="0"/>
+          </a:lnRef>
+          <a:fillRef idx="0">
+            <a:scrgbClr r="0" g="0" b="0"/>
+          </a:fillRef>
+          <a:effectRef idx="0">
+            <a:scrgbClr r="0" g="0" b="0"/>
+          </a:effectRef>
+          <a:fontRef idx="minor">
+            <a:schemeClr val="lt1"/>
+          </a:fontRef>
+        </p:style>
+        <p:txBody>
+          <a:bodyPr rtlCol="0" anchor="ctr"/>
+          <a:lstStyle/>
+          <a:p>
+            <a:pPr algn="ctr"/>
+            <a:r>
+              <a:rPr lang="en-GB" sz="1600" dirty="0"/>
+              <a:t>Bug fix</a:t>
+            </a:r>
+          </a:p>
+        </p:txBody>
+      </p:sp>
+      <p:cxnSp>
+        <p:nvCxnSpPr>
+          <p:cNvPr id="38" name="Straight Arrow Connector 37">
+            <a:extLst>
+              <a:ext uri="{FF2B5EF4-FFF2-40B4-BE49-F238E27FC236}">
+                <a16:creationId xmlns:a16="http://schemas.microsoft.com/office/drawing/2014/main" id="{3FA583B4-1D9F-4B49-80A3-6664E20F2B55}"/>
+              </a:ext>
+            </a:extLst>
+          </p:cNvPr>
+          <p:cNvCxnSpPr>
+            <a:cxnSpLocks/>
+            <a:stCxn id="37" idx="2"/>
+            <a:endCxn id="36" idx="6"/>
+          </p:cNvCxnSpPr>
+          <p:nvPr/>
+        </p:nvCxnSpPr>
+        <p:spPr>
+          <a:xfrm flipH="1">
+            <a:off x="7454700" y="5295548"/>
+            <a:ext cx="743716" cy="1"/>
+          </a:xfrm>
+          <a:prstGeom prst="straightConnector1">
+            <a:avLst/>
+          </a:prstGeom>
+          <a:ln>
+            <a:tailEnd type="triangle"/>
+          </a:ln>
+        </p:spPr>
+        <p:style>
+          <a:lnRef idx="1">
+            <a:schemeClr val="dk1"/>
+          </a:lnRef>
+          <a:fillRef idx="0">
+            <a:schemeClr val="dk1"/>
+          </a:fillRef>
+          <a:effectRef idx="0">
+            <a:schemeClr val="dk1"/>
+          </a:effectRef>
+          <a:fontRef idx="minor">
+            <a:schemeClr val="tx1"/>
+          </a:fontRef>
+        </p:style>
+      </p:cxnSp>
+    </p:spTree>
+    <p:extLst>
+      <p:ext uri="{BB962C8B-B14F-4D97-AF65-F5344CB8AC3E}">
+        <p14:creationId xmlns:p14="http://schemas.microsoft.com/office/powerpoint/2010/main" val="1450956776"/>
+      </p:ext>
+    </p:extLst>
+  </p:cSld>
+  <p:clrMapOvr>
+    <a:masterClrMapping/>
+  </p:clrMapOvr>
+  <mc:AlternateContent xmlns:mc="http://schemas.openxmlformats.org/markup-compatibility/2006" xmlns:p14="http://schemas.microsoft.com/office/powerpoint/2010/main">
+    <mc:Choice Requires="p14">
+      <p:transition spd="med" p14:dur="700">
+        <p:fade/>
+      </p:transition>
+    </mc:Choice>
+    <mc:Fallback xmlns="">
+      <p:transition spd="med">
+        <p:fade/>
+      </p:transition>
+    </mc:Fallback>
+  </mc:AlternateContent>
+</p:sld>
+</file>
+
+<file path=ppt/slides/slide32.xml><?xml version="1.0" encoding="utf-8"?>
+<p:sld xmlns:a="http://schemas.openxmlformats.org/drawingml/2006/main" xmlns:r="http://schemas.openxmlformats.org/officeDocument/2006/relationships" xmlns:p="http://schemas.openxmlformats.org/presentationml/2006/main">
+  <p:cSld>
+    <p:spTree>
+      <p:nvGrpSpPr>
+        <p:cNvPr id="1" name=""/>
+        <p:cNvGrpSpPr/>
+        <p:nvPr/>
+      </p:nvGrpSpPr>
+      <p:grpSpPr>
+        <a:xfrm>
+          <a:off x="0" y="0"/>
+          <a:ext cx="0" cy="0"/>
+          <a:chOff x="0" y="0"/>
+          <a:chExt cx="0" cy="0"/>
+        </a:xfrm>
+      </p:grpSpPr>
+      <p:sp>
+        <p:nvSpPr>
+          <p:cNvPr id="13" name="Rectangle: Rounded Corners 12">
+            <a:extLst>
+              <a:ext uri="{FF2B5EF4-FFF2-40B4-BE49-F238E27FC236}">
+                <a16:creationId xmlns:a16="http://schemas.microsoft.com/office/drawing/2014/main" id="{1E4A7F89-0EE4-44B2-BDAA-9CD575279057}"/>
+              </a:ext>
+            </a:extLst>
+          </p:cNvPr>
+          <p:cNvSpPr/>
+          <p:nvPr/>
+        </p:nvSpPr>
+        <p:spPr>
+          <a:xfrm>
+            <a:off x="1126444" y="4079146"/>
+            <a:ext cx="2984161" cy="1866532"/>
+          </a:xfrm>
+          <a:prstGeom prst="roundRect">
+            <a:avLst/>
+          </a:prstGeom>
+        </p:spPr>
+        <p:style>
+          <a:lnRef idx="1">
+            <a:schemeClr val="dk1"/>
+          </a:lnRef>
+          <a:fillRef idx="2">
+            <a:schemeClr val="dk1"/>
+          </a:fillRef>
+          <a:effectRef idx="1">
+            <a:schemeClr val="dk1"/>
+          </a:effectRef>
+          <a:fontRef idx="minor">
+            <a:schemeClr val="dk1"/>
+          </a:fontRef>
+        </p:style>
+        <p:txBody>
+          <a:bodyPr rtlCol="0" anchor="ctr"/>
+          <a:lstStyle/>
+          <a:p>
+            <a:pPr algn="ctr"/>
+            <a:r>
+              <a:rPr lang="en-GB" dirty="0"/>
+              <a:t>Now there are three pieces of independent development work being carried out alongside each other</a:t>
+            </a:r>
+          </a:p>
+        </p:txBody>
+      </p:sp>
+      <p:grpSp>
+        <p:nvGrpSpPr>
+          <p:cNvPr id="19" name="Group 18">
+            <a:extLst>
+              <a:ext uri="{FF2B5EF4-FFF2-40B4-BE49-F238E27FC236}">
+                <a16:creationId xmlns:a16="http://schemas.microsoft.com/office/drawing/2014/main" id="{269D3782-5F2D-4846-A561-56DCEF504C72}"/>
+              </a:ext>
+            </a:extLst>
+          </p:cNvPr>
+          <p:cNvGrpSpPr/>
+          <p:nvPr/>
+        </p:nvGrpSpPr>
+        <p:grpSpPr>
+          <a:xfrm>
+            <a:off x="287645" y="2590101"/>
+            <a:ext cx="4005000" cy="838899"/>
+            <a:chOff x="1610686" y="2427215"/>
+            <a:chExt cx="4005000" cy="838899"/>
+          </a:xfrm>
+        </p:grpSpPr>
+        <p:sp>
+          <p:nvSpPr>
+            <p:cNvPr id="20" name="Oval 19">
+              <a:extLst>
+                <a:ext uri="{FF2B5EF4-FFF2-40B4-BE49-F238E27FC236}">
+                  <a16:creationId xmlns:a16="http://schemas.microsoft.com/office/drawing/2014/main" id="{3B5A2C4A-CA16-44A7-A144-D182126ABD50}"/>
+                </a:ext>
+              </a:extLst>
+            </p:cNvPr>
+            <p:cNvSpPr/>
+            <p:nvPr/>
+          </p:nvSpPr>
+          <p:spPr>
+            <a:xfrm>
+              <a:off x="1610686" y="2427215"/>
+              <a:ext cx="838800" cy="838899"/>
+            </a:xfrm>
+            <a:prstGeom prst="ellipse">
+              <a:avLst/>
+            </a:prstGeom>
+            <a:solidFill>
+              <a:schemeClr val="accent2">
+                <a:alpha val="50000"/>
+              </a:schemeClr>
+            </a:solidFill>
+            <a:ln>
+              <a:noFill/>
+            </a:ln>
+          </p:spPr>
+          <p:style>
+            <a:lnRef idx="0">
+              <a:scrgbClr r="0" g="0" b="0"/>
+            </a:lnRef>
+            <a:fillRef idx="0">
+              <a:scrgbClr r="0" g="0" b="0"/>
+            </a:fillRef>
+            <a:effectRef idx="0">
+              <a:scrgbClr r="0" g="0" b="0"/>
+            </a:effectRef>
+            <a:fontRef idx="minor">
+              <a:schemeClr val="lt1"/>
+            </a:fontRef>
+          </p:style>
+          <p:txBody>
+            <a:bodyPr rtlCol="0" anchor="ctr"/>
+            <a:lstStyle/>
+            <a:p>
+              <a:pPr algn="ctr"/>
+              <a:endParaRPr lang="en-GB" dirty="0"/>
+            </a:p>
+          </p:txBody>
+        </p:sp>
+        <p:sp>
+          <p:nvSpPr>
+            <p:cNvPr id="21" name="Oval 20">
+              <a:extLst>
+                <a:ext uri="{FF2B5EF4-FFF2-40B4-BE49-F238E27FC236}">
+                  <a16:creationId xmlns:a16="http://schemas.microsoft.com/office/drawing/2014/main" id="{A2E235D1-3D5B-48E3-B005-235179F6D922}"/>
+                </a:ext>
+              </a:extLst>
+            </p:cNvPr>
+            <p:cNvSpPr/>
+            <p:nvPr/>
+          </p:nvSpPr>
+          <p:spPr>
+            <a:xfrm>
+              <a:off x="3193786" y="2427215"/>
+              <a:ext cx="838800" cy="838899"/>
+            </a:xfrm>
+            <a:prstGeom prst="ellipse">
+              <a:avLst/>
+            </a:prstGeom>
+            <a:solidFill>
+              <a:schemeClr val="accent2">
+                <a:alpha val="50000"/>
+              </a:schemeClr>
+            </a:solidFill>
+            <a:ln>
+              <a:noFill/>
+            </a:ln>
+          </p:spPr>
+          <p:style>
+            <a:lnRef idx="0">
+              <a:scrgbClr r="0" g="0" b="0"/>
+            </a:lnRef>
+            <a:fillRef idx="0">
+              <a:scrgbClr r="0" g="0" b="0"/>
+            </a:fillRef>
+            <a:effectRef idx="0">
+              <a:scrgbClr r="0" g="0" b="0"/>
+            </a:effectRef>
+            <a:fontRef idx="minor">
+              <a:schemeClr val="lt1"/>
+            </a:fontRef>
+          </p:style>
+          <p:txBody>
+            <a:bodyPr rtlCol="0" anchor="ctr"/>
+            <a:lstStyle/>
+            <a:p>
+              <a:pPr algn="ctr"/>
+              <a:endParaRPr lang="en-GB" dirty="0"/>
+            </a:p>
+          </p:txBody>
+        </p:sp>
+        <p:sp>
+          <p:nvSpPr>
+            <p:cNvPr id="22" name="Oval 21">
+              <a:extLst>
+                <a:ext uri="{FF2B5EF4-FFF2-40B4-BE49-F238E27FC236}">
+                  <a16:creationId xmlns:a16="http://schemas.microsoft.com/office/drawing/2014/main" id="{E2D2754B-CC1E-4EB9-874D-8AFB0F5B25EB}"/>
+                </a:ext>
+              </a:extLst>
+            </p:cNvPr>
+            <p:cNvSpPr/>
+            <p:nvPr/>
+          </p:nvSpPr>
+          <p:spPr>
+            <a:xfrm>
+              <a:off x="4776886" y="2427215"/>
+              <a:ext cx="838800" cy="838899"/>
+            </a:xfrm>
+            <a:prstGeom prst="ellipse">
+              <a:avLst/>
+            </a:prstGeom>
+            <a:solidFill>
+              <a:schemeClr val="accent2">
+                <a:alpha val="50000"/>
+              </a:schemeClr>
+            </a:solidFill>
+            <a:ln>
+              <a:noFill/>
+            </a:ln>
+          </p:spPr>
+          <p:style>
+            <a:lnRef idx="0">
+              <a:scrgbClr r="0" g="0" b="0"/>
+            </a:lnRef>
+            <a:fillRef idx="0">
+              <a:scrgbClr r="0" g="0" b="0"/>
+            </a:fillRef>
+            <a:effectRef idx="0">
+              <a:scrgbClr r="0" g="0" b="0"/>
+            </a:effectRef>
+            <a:fontRef idx="minor">
+              <a:schemeClr val="lt1"/>
+            </a:fontRef>
+          </p:style>
+          <p:txBody>
+            <a:bodyPr rtlCol="0" anchor="ctr"/>
+            <a:lstStyle/>
+            <a:p>
+              <a:pPr algn="ctr"/>
+              <a:endParaRPr lang="en-GB" dirty="0"/>
+            </a:p>
+          </p:txBody>
+        </p:sp>
+        <p:cxnSp>
+          <p:nvCxnSpPr>
+            <p:cNvPr id="23" name="Straight Connector 22">
+              <a:extLst>
+                <a:ext uri="{FF2B5EF4-FFF2-40B4-BE49-F238E27FC236}">
+                  <a16:creationId xmlns:a16="http://schemas.microsoft.com/office/drawing/2014/main" id="{D05DA3C7-4173-462B-BA15-9FCD562D1955}"/>
+                </a:ext>
+              </a:extLst>
+            </p:cNvPr>
+            <p:cNvCxnSpPr>
+              <a:cxnSpLocks/>
+              <a:stCxn id="20" idx="6"/>
+            </p:cNvCxnSpPr>
+            <p:nvPr/>
+          </p:nvCxnSpPr>
+          <p:spPr>
+            <a:xfrm>
+              <a:off x="2449486" y="2846665"/>
+              <a:ext cx="744300" cy="0"/>
+            </a:xfrm>
+            <a:prstGeom prst="line">
+              <a:avLst/>
+            </a:prstGeom>
+          </p:spPr>
+          <p:style>
+            <a:lnRef idx="1">
+              <a:schemeClr val="accent2"/>
+            </a:lnRef>
+            <a:fillRef idx="0">
+              <a:schemeClr val="accent2"/>
+            </a:fillRef>
+            <a:effectRef idx="0">
+              <a:schemeClr val="accent2"/>
+            </a:effectRef>
+            <a:fontRef idx="minor">
+              <a:schemeClr val="tx1"/>
+            </a:fontRef>
+          </p:style>
+        </p:cxnSp>
+        <p:cxnSp>
+          <p:nvCxnSpPr>
+            <p:cNvPr id="24" name="Straight Connector 23">
+              <a:extLst>
+                <a:ext uri="{FF2B5EF4-FFF2-40B4-BE49-F238E27FC236}">
+                  <a16:creationId xmlns:a16="http://schemas.microsoft.com/office/drawing/2014/main" id="{F5A6D9EC-7A99-46E2-B3D5-219CACE97D2D}"/>
+                </a:ext>
+              </a:extLst>
+            </p:cNvPr>
+            <p:cNvCxnSpPr>
+              <a:cxnSpLocks/>
+              <a:stCxn id="21" idx="6"/>
+              <a:endCxn id="22" idx="2"/>
+            </p:cNvCxnSpPr>
+            <p:nvPr/>
+          </p:nvCxnSpPr>
+          <p:spPr>
+            <a:xfrm>
+              <a:off x="4032586" y="2846665"/>
+              <a:ext cx="744300" cy="0"/>
+            </a:xfrm>
+            <a:prstGeom prst="line">
+              <a:avLst/>
+            </a:prstGeom>
+          </p:spPr>
+          <p:style>
+            <a:lnRef idx="1">
+              <a:schemeClr val="accent2"/>
+            </a:lnRef>
+            <a:fillRef idx="0">
+              <a:schemeClr val="accent2"/>
+            </a:fillRef>
+            <a:effectRef idx="0">
+              <a:schemeClr val="accent2"/>
+            </a:effectRef>
+            <a:fontRef idx="minor">
+              <a:schemeClr val="tx1"/>
+            </a:fontRef>
+          </p:style>
+        </p:cxnSp>
+      </p:grpSp>
+      <p:sp>
+        <p:nvSpPr>
+          <p:cNvPr id="25" name="Oval 24">
+            <a:extLst>
+              <a:ext uri="{FF2B5EF4-FFF2-40B4-BE49-F238E27FC236}">
+                <a16:creationId xmlns:a16="http://schemas.microsoft.com/office/drawing/2014/main" id="{69EDCD39-0CE5-4FA4-BE32-64EF92AA7AFE}"/>
+              </a:ext>
+            </a:extLst>
+          </p:cNvPr>
+          <p:cNvSpPr/>
+          <p:nvPr/>
+        </p:nvSpPr>
+        <p:spPr>
+          <a:xfrm>
+            <a:off x="5036945" y="2590101"/>
+            <a:ext cx="838800" cy="838899"/>
+          </a:xfrm>
+          <a:prstGeom prst="ellipse">
+            <a:avLst/>
+          </a:prstGeom>
+          <a:solidFill>
+            <a:schemeClr val="accent2">
+              <a:alpha val="50000"/>
+            </a:schemeClr>
+          </a:solidFill>
+          <a:ln>
+            <a:noFill/>
+          </a:ln>
+        </p:spPr>
+        <p:style>
+          <a:lnRef idx="0">
+            <a:scrgbClr r="0" g="0" b="0"/>
+          </a:lnRef>
+          <a:fillRef idx="0">
+            <a:scrgbClr r="0" g="0" b="0"/>
+          </a:fillRef>
+          <a:effectRef idx="0">
+            <a:scrgbClr r="0" g="0" b="0"/>
+          </a:effectRef>
+          <a:fontRef idx="minor">
+            <a:schemeClr val="lt1"/>
+          </a:fontRef>
+        </p:style>
+        <p:txBody>
+          <a:bodyPr rtlCol="0" anchor="ctr"/>
+          <a:lstStyle/>
+          <a:p>
+            <a:pPr algn="ctr"/>
+            <a:endParaRPr lang="en-GB" dirty="0"/>
+          </a:p>
+        </p:txBody>
+      </p:sp>
+      <p:cxnSp>
+        <p:nvCxnSpPr>
+          <p:cNvPr id="26" name="Straight Connector 25">
+            <a:extLst>
+              <a:ext uri="{FF2B5EF4-FFF2-40B4-BE49-F238E27FC236}">
+                <a16:creationId xmlns:a16="http://schemas.microsoft.com/office/drawing/2014/main" id="{C99A3B61-0D07-4843-AE02-F8F520A1AC3F}"/>
+              </a:ext>
+            </a:extLst>
+          </p:cNvPr>
+          <p:cNvCxnSpPr>
+            <a:cxnSpLocks/>
+            <a:endCxn id="25" idx="2"/>
+          </p:cNvCxnSpPr>
+          <p:nvPr/>
+        </p:nvCxnSpPr>
+        <p:spPr>
+          <a:xfrm>
+            <a:off x="4292645" y="3009551"/>
+            <a:ext cx="744300" cy="0"/>
+          </a:xfrm>
+          <a:prstGeom prst="line">
+            <a:avLst/>
+          </a:prstGeom>
+        </p:spPr>
+        <p:style>
+          <a:lnRef idx="1">
+            <a:schemeClr val="accent2"/>
+          </a:lnRef>
+          <a:fillRef idx="0">
+            <a:schemeClr val="accent2"/>
+          </a:fillRef>
+          <a:effectRef idx="0">
+            <a:schemeClr val="accent2"/>
+          </a:effectRef>
+          <a:fontRef idx="minor">
+            <a:schemeClr val="tx1"/>
+          </a:fontRef>
+        </p:style>
+      </p:cxnSp>
+      <p:sp>
+        <p:nvSpPr>
+          <p:cNvPr id="27" name="Oval 26">
+            <a:extLst>
+              <a:ext uri="{FF2B5EF4-FFF2-40B4-BE49-F238E27FC236}">
+                <a16:creationId xmlns:a16="http://schemas.microsoft.com/office/drawing/2014/main" id="{1F097433-53E8-4B8F-BAC2-79268AFEFD6E}"/>
+              </a:ext>
+            </a:extLst>
+          </p:cNvPr>
+          <p:cNvSpPr/>
+          <p:nvPr/>
+        </p:nvSpPr>
+        <p:spPr>
+          <a:xfrm>
+            <a:off x="5036945" y="765494"/>
+            <a:ext cx="838800" cy="838899"/>
+          </a:xfrm>
+          <a:prstGeom prst="ellipse">
+            <a:avLst/>
+          </a:prstGeom>
+          <a:solidFill>
+            <a:schemeClr val="dk1"/>
+          </a:solidFill>
+          <a:ln>
+            <a:noFill/>
+          </a:ln>
+        </p:spPr>
+        <p:style>
+          <a:lnRef idx="0">
+            <a:scrgbClr r="0" g="0" b="0"/>
+          </a:lnRef>
+          <a:fillRef idx="0">
+            <a:scrgbClr r="0" g="0" b="0"/>
+          </a:fillRef>
+          <a:effectRef idx="0">
+            <a:scrgbClr r="0" g="0" b="0"/>
+          </a:effectRef>
+          <a:fontRef idx="minor">
+            <a:schemeClr val="lt1"/>
+          </a:fontRef>
+        </p:style>
+        <p:txBody>
+          <a:bodyPr rtlCol="0" anchor="ctr"/>
+          <a:lstStyle/>
+          <a:p>
+            <a:pPr algn="ctr"/>
+            <a:endParaRPr lang="en-GB" dirty="0"/>
+          </a:p>
+        </p:txBody>
+      </p:sp>
+      <p:cxnSp>
+        <p:nvCxnSpPr>
+          <p:cNvPr id="29" name="Connector: Elbow 28">
+            <a:extLst>
+              <a:ext uri="{FF2B5EF4-FFF2-40B4-BE49-F238E27FC236}">
+                <a16:creationId xmlns:a16="http://schemas.microsoft.com/office/drawing/2014/main" id="{FCE90231-188F-4BCF-82B1-19008D47CD26}"/>
+              </a:ext>
+            </a:extLst>
+          </p:cNvPr>
+          <p:cNvCxnSpPr>
+            <a:stCxn id="22" idx="0"/>
+            <a:endCxn id="27" idx="2"/>
+          </p:cNvCxnSpPr>
+          <p:nvPr/>
+        </p:nvCxnSpPr>
+        <p:spPr>
+          <a:xfrm rot="5400000" flipH="1" flipV="1">
+            <a:off x="3752517" y="1305673"/>
+            <a:ext cx="1405157" cy="1163700"/>
+          </a:xfrm>
+          <a:prstGeom prst="bentConnector2">
+            <a:avLst/>
+          </a:prstGeom>
+        </p:spPr>
+        <p:style>
+          <a:lnRef idx="1">
+            <a:schemeClr val="accent2"/>
+          </a:lnRef>
+          <a:fillRef idx="0">
+            <a:schemeClr val="accent2"/>
+          </a:fillRef>
+          <a:effectRef idx="0">
+            <a:schemeClr val="accent2"/>
+          </a:effectRef>
+          <a:fontRef idx="minor">
+            <a:schemeClr val="tx1"/>
+          </a:fontRef>
+        </p:style>
+      </p:cxnSp>
+      <p:sp>
+        <p:nvSpPr>
+          <p:cNvPr id="18" name="Oval 17">
+            <a:extLst>
+              <a:ext uri="{FF2B5EF4-FFF2-40B4-BE49-F238E27FC236}">
+                <a16:creationId xmlns:a16="http://schemas.microsoft.com/office/drawing/2014/main" id="{C5CCCA15-17FB-4AAA-B730-F2B5D870F1C5}"/>
+              </a:ext>
+            </a:extLst>
+          </p:cNvPr>
+          <p:cNvSpPr/>
+          <p:nvPr/>
+        </p:nvSpPr>
+        <p:spPr>
+          <a:xfrm>
+            <a:off x="6615900" y="2590101"/>
+            <a:ext cx="838800" cy="838899"/>
+          </a:xfrm>
+          <a:prstGeom prst="ellipse">
+            <a:avLst/>
+          </a:prstGeom>
+          <a:solidFill>
+            <a:schemeClr val="accent2">
+              <a:alpha val="50000"/>
+            </a:schemeClr>
+          </a:solidFill>
+          <a:ln>
+            <a:noFill/>
+          </a:ln>
+        </p:spPr>
+        <p:style>
+          <a:lnRef idx="0">
+            <a:scrgbClr r="0" g="0" b="0"/>
+          </a:lnRef>
+          <a:fillRef idx="0">
+            <a:scrgbClr r="0" g="0" b="0"/>
+          </a:fillRef>
+          <a:effectRef idx="0">
+            <a:scrgbClr r="0" g="0" b="0"/>
+          </a:effectRef>
+          <a:fontRef idx="minor">
+            <a:schemeClr val="lt1"/>
+          </a:fontRef>
+        </p:style>
+        <p:txBody>
+          <a:bodyPr rtlCol="0" anchor="ctr"/>
+          <a:lstStyle/>
+          <a:p>
+            <a:pPr algn="ctr"/>
+            <a:endParaRPr lang="en-GB" dirty="0"/>
+          </a:p>
+        </p:txBody>
+      </p:sp>
+      <p:cxnSp>
+        <p:nvCxnSpPr>
+          <p:cNvPr id="28" name="Straight Connector 27">
+            <a:extLst>
+              <a:ext uri="{FF2B5EF4-FFF2-40B4-BE49-F238E27FC236}">
+                <a16:creationId xmlns:a16="http://schemas.microsoft.com/office/drawing/2014/main" id="{DCBAE851-9DE4-4CF7-8636-06004D086804}"/>
+              </a:ext>
+            </a:extLst>
+          </p:cNvPr>
+          <p:cNvCxnSpPr>
+            <a:cxnSpLocks/>
+            <a:endCxn id="18" idx="2"/>
+          </p:cNvCxnSpPr>
+          <p:nvPr/>
+        </p:nvCxnSpPr>
+        <p:spPr>
+          <a:xfrm>
+            <a:off x="5871600" y="3009551"/>
+            <a:ext cx="744300" cy="0"/>
+          </a:xfrm>
+          <a:prstGeom prst="line">
+            <a:avLst/>
+          </a:prstGeom>
+        </p:spPr>
+        <p:style>
+          <a:lnRef idx="1">
+            <a:schemeClr val="accent2"/>
+          </a:lnRef>
+          <a:fillRef idx="0">
+            <a:schemeClr val="accent2"/>
+          </a:fillRef>
+          <a:effectRef idx="0">
+            <a:schemeClr val="accent2"/>
+          </a:effectRef>
+          <a:fontRef idx="minor">
+            <a:schemeClr val="tx1"/>
+          </a:fontRef>
+        </p:style>
+      </p:cxnSp>
+      <p:sp>
+        <p:nvSpPr>
+          <p:cNvPr id="32" name="Oval 31">
+            <a:extLst>
+              <a:ext uri="{FF2B5EF4-FFF2-40B4-BE49-F238E27FC236}">
+                <a16:creationId xmlns:a16="http://schemas.microsoft.com/office/drawing/2014/main" id="{EA12E314-7309-412E-AAFB-1B223829F5AF}"/>
+              </a:ext>
+            </a:extLst>
+          </p:cNvPr>
+          <p:cNvSpPr/>
+          <p:nvPr/>
+        </p:nvSpPr>
+        <p:spPr>
+          <a:xfrm>
+            <a:off x="6620045" y="765494"/>
+            <a:ext cx="838800" cy="838899"/>
+          </a:xfrm>
+          <a:prstGeom prst="ellipse">
+            <a:avLst/>
+          </a:prstGeom>
+          <a:solidFill>
+            <a:schemeClr val="dk1"/>
+          </a:solidFill>
+          <a:ln>
+            <a:noFill/>
+          </a:ln>
+        </p:spPr>
+        <p:style>
+          <a:lnRef idx="0">
+            <a:scrgbClr r="0" g="0" b="0"/>
+          </a:lnRef>
+          <a:fillRef idx="0">
+            <a:scrgbClr r="0" g="0" b="0"/>
+          </a:fillRef>
+          <a:effectRef idx="0">
+            <a:scrgbClr r="0" g="0" b="0"/>
+          </a:effectRef>
+          <a:fontRef idx="minor">
+            <a:schemeClr val="lt1"/>
+          </a:fontRef>
+        </p:style>
+        <p:txBody>
+          <a:bodyPr rtlCol="0" anchor="ctr"/>
+          <a:lstStyle/>
+          <a:p>
+            <a:pPr algn="ctr"/>
+            <a:endParaRPr lang="en-GB" dirty="0"/>
+          </a:p>
+        </p:txBody>
+      </p:sp>
+      <p:cxnSp>
+        <p:nvCxnSpPr>
+          <p:cNvPr id="35" name="Straight Connector 34">
+            <a:extLst>
+              <a:ext uri="{FF2B5EF4-FFF2-40B4-BE49-F238E27FC236}">
+                <a16:creationId xmlns:a16="http://schemas.microsoft.com/office/drawing/2014/main" id="{08B551E1-ABD6-4D1B-BA23-0F524DFB4AE4}"/>
+              </a:ext>
+            </a:extLst>
+          </p:cNvPr>
+          <p:cNvCxnSpPr>
+            <a:cxnSpLocks/>
+          </p:cNvCxnSpPr>
+          <p:nvPr/>
+        </p:nvCxnSpPr>
+        <p:spPr>
+          <a:xfrm>
+            <a:off x="5875745" y="1184944"/>
+            <a:ext cx="744300" cy="0"/>
+          </a:xfrm>
+          <a:prstGeom prst="line">
+            <a:avLst/>
+          </a:prstGeom>
+        </p:spPr>
+        <p:style>
+          <a:lnRef idx="1">
+            <a:schemeClr val="accent2"/>
+          </a:lnRef>
+          <a:fillRef idx="0">
+            <a:schemeClr val="accent2"/>
+          </a:fillRef>
+          <a:effectRef idx="0">
+            <a:schemeClr val="accent2"/>
+          </a:effectRef>
+          <a:fontRef idx="minor">
+            <a:schemeClr val="tx1"/>
+          </a:fontRef>
+        </p:style>
+      </p:cxnSp>
+      <p:sp>
+        <p:nvSpPr>
+          <p:cNvPr id="36" name="Oval 35">
+            <a:extLst>
+              <a:ext uri="{FF2B5EF4-FFF2-40B4-BE49-F238E27FC236}">
+                <a16:creationId xmlns:a16="http://schemas.microsoft.com/office/drawing/2014/main" id="{8B30E8C0-47B5-438A-9179-5A351B2D42D4}"/>
+              </a:ext>
+            </a:extLst>
+          </p:cNvPr>
+          <p:cNvSpPr/>
+          <p:nvPr/>
+        </p:nvSpPr>
+        <p:spPr>
+          <a:xfrm>
+            <a:off x="6615900" y="4876099"/>
+            <a:ext cx="838800" cy="838899"/>
+          </a:xfrm>
+          <a:prstGeom prst="ellipse">
+            <a:avLst/>
+          </a:prstGeom>
+          <a:solidFill>
+            <a:schemeClr val="accent1">
+              <a:alpha val="50000"/>
+            </a:schemeClr>
+          </a:solidFill>
+          <a:ln>
+            <a:noFill/>
+          </a:ln>
+        </p:spPr>
+        <p:style>
+          <a:lnRef idx="0">
+            <a:scrgbClr r="0" g="0" b="0"/>
+          </a:lnRef>
+          <a:fillRef idx="0">
+            <a:scrgbClr r="0" g="0" b="0"/>
+          </a:fillRef>
+          <a:effectRef idx="0">
+            <a:scrgbClr r="0" g="0" b="0"/>
+          </a:effectRef>
+          <a:fontRef idx="minor">
+            <a:schemeClr val="lt1"/>
+          </a:fontRef>
+        </p:style>
+        <p:txBody>
+          <a:bodyPr rtlCol="0" anchor="ctr"/>
+          <a:lstStyle/>
+          <a:p>
+            <a:pPr algn="ctr"/>
+            <a:endParaRPr lang="en-GB" dirty="0"/>
+          </a:p>
+        </p:txBody>
+      </p:sp>
+      <p:cxnSp>
+        <p:nvCxnSpPr>
+          <p:cNvPr id="6" name="Connector: Elbow 5">
+            <a:extLst>
+              <a:ext uri="{FF2B5EF4-FFF2-40B4-BE49-F238E27FC236}">
+                <a16:creationId xmlns:a16="http://schemas.microsoft.com/office/drawing/2014/main" id="{5796D08A-8EAF-4D9E-AC59-6516A5D78A32}"/>
+              </a:ext>
+            </a:extLst>
+          </p:cNvPr>
+          <p:cNvCxnSpPr>
+            <a:stCxn id="25" idx="4"/>
+            <a:endCxn id="36" idx="2"/>
+          </p:cNvCxnSpPr>
+          <p:nvPr/>
+        </p:nvCxnSpPr>
+        <p:spPr>
+          <a:xfrm rot="16200000" flipH="1">
+            <a:off x="5102848" y="3782496"/>
+            <a:ext cx="1866549" cy="1159555"/>
+          </a:xfrm>
+          <a:prstGeom prst="bentConnector2">
+            <a:avLst/>
+          </a:prstGeom>
+        </p:spPr>
+        <p:style>
+          <a:lnRef idx="1">
+            <a:schemeClr val="accent1"/>
+          </a:lnRef>
+          <a:fillRef idx="0">
+            <a:schemeClr val="accent1"/>
+          </a:fillRef>
+          <a:effectRef idx="0">
+            <a:schemeClr val="accent1"/>
+          </a:effectRef>
+          <a:fontRef idx="minor">
+            <a:schemeClr val="tx1"/>
+          </a:fontRef>
+        </p:style>
+      </p:cxnSp>
+      <p:sp>
+        <p:nvSpPr>
+          <p:cNvPr id="30" name="Oval 29">
+            <a:extLst>
+              <a:ext uri="{FF2B5EF4-FFF2-40B4-BE49-F238E27FC236}">
+                <a16:creationId xmlns:a16="http://schemas.microsoft.com/office/drawing/2014/main" id="{C1290816-B977-42DF-B418-FF5F602DCE5B}"/>
+              </a:ext>
+            </a:extLst>
+          </p:cNvPr>
+          <p:cNvSpPr/>
+          <p:nvPr/>
+        </p:nvSpPr>
+        <p:spPr>
+          <a:xfrm>
+            <a:off x="8210781" y="765494"/>
+            <a:ext cx="838800" cy="838899"/>
+          </a:xfrm>
+          <a:prstGeom prst="ellipse">
+            <a:avLst/>
+          </a:prstGeom>
+          <a:solidFill>
+            <a:schemeClr val="dk1"/>
+          </a:solidFill>
+          <a:ln>
+            <a:noFill/>
+          </a:ln>
+        </p:spPr>
+        <p:style>
+          <a:lnRef idx="0">
+            <a:scrgbClr r="0" g="0" b="0"/>
+          </a:lnRef>
+          <a:fillRef idx="0">
+            <a:scrgbClr r="0" g="0" b="0"/>
+          </a:fillRef>
+          <a:effectRef idx="0">
+            <a:scrgbClr r="0" g="0" b="0"/>
+          </a:effectRef>
+          <a:fontRef idx="minor">
+            <a:schemeClr val="lt1"/>
+          </a:fontRef>
+        </p:style>
+        <p:txBody>
+          <a:bodyPr rtlCol="0" anchor="ctr"/>
+          <a:lstStyle/>
+          <a:p>
+            <a:pPr algn="ctr"/>
+            <a:endParaRPr lang="en-GB" dirty="0"/>
+          </a:p>
+        </p:txBody>
+      </p:sp>
+      <p:cxnSp>
+        <p:nvCxnSpPr>
+          <p:cNvPr id="31" name="Straight Connector 30">
+            <a:extLst>
+              <a:ext uri="{FF2B5EF4-FFF2-40B4-BE49-F238E27FC236}">
+                <a16:creationId xmlns:a16="http://schemas.microsoft.com/office/drawing/2014/main" id="{D225656F-EDFC-4888-A231-2B40230CBBE5}"/>
+              </a:ext>
+            </a:extLst>
+          </p:cNvPr>
+          <p:cNvCxnSpPr>
+            <a:cxnSpLocks/>
+          </p:cNvCxnSpPr>
+          <p:nvPr/>
+        </p:nvCxnSpPr>
+        <p:spPr>
+          <a:xfrm>
+            <a:off x="7466481" y="1184944"/>
+            <a:ext cx="744300" cy="0"/>
+          </a:xfrm>
+          <a:prstGeom prst="line">
+            <a:avLst/>
+          </a:prstGeom>
+        </p:spPr>
+        <p:style>
+          <a:lnRef idx="1">
+            <a:schemeClr val="accent2"/>
+          </a:lnRef>
+          <a:fillRef idx="0">
+            <a:schemeClr val="accent2"/>
+          </a:fillRef>
+          <a:effectRef idx="0">
+            <a:schemeClr val="accent2"/>
+          </a:effectRef>
+          <a:fontRef idx="minor">
+            <a:schemeClr val="tx1"/>
+          </a:fontRef>
+        </p:style>
+      </p:cxnSp>
+      <p:sp>
+        <p:nvSpPr>
+          <p:cNvPr id="39" name="Oval 38">
+            <a:extLst>
+              <a:ext uri="{FF2B5EF4-FFF2-40B4-BE49-F238E27FC236}">
+                <a16:creationId xmlns:a16="http://schemas.microsoft.com/office/drawing/2014/main" id="{8DE4A5D4-3A09-4880-8214-FE4063F2F54D}"/>
+              </a:ext>
+            </a:extLst>
+          </p:cNvPr>
+          <p:cNvSpPr/>
+          <p:nvPr/>
+        </p:nvSpPr>
+        <p:spPr>
+          <a:xfrm>
+            <a:off x="8210781" y="2590102"/>
+            <a:ext cx="838800" cy="838899"/>
+          </a:xfrm>
+          <a:prstGeom prst="ellipse">
+            <a:avLst/>
+          </a:prstGeom>
+          <a:solidFill>
+            <a:schemeClr val="accent2">
+              <a:alpha val="50000"/>
+            </a:schemeClr>
+          </a:solidFill>
+          <a:ln>
+            <a:noFill/>
+          </a:ln>
+        </p:spPr>
+        <p:style>
+          <a:lnRef idx="0">
+            <a:scrgbClr r="0" g="0" b="0"/>
+          </a:lnRef>
+          <a:fillRef idx="0">
+            <a:scrgbClr r="0" g="0" b="0"/>
+          </a:fillRef>
+          <a:effectRef idx="0">
+            <a:scrgbClr r="0" g="0" b="0"/>
+          </a:effectRef>
+          <a:fontRef idx="minor">
+            <a:schemeClr val="lt1"/>
+          </a:fontRef>
+        </p:style>
+        <p:txBody>
+          <a:bodyPr rtlCol="0" anchor="ctr"/>
+          <a:lstStyle/>
+          <a:p>
+            <a:pPr algn="ctr"/>
+            <a:endParaRPr lang="en-GB" dirty="0"/>
+          </a:p>
+        </p:txBody>
+      </p:sp>
+      <p:cxnSp>
+        <p:nvCxnSpPr>
+          <p:cNvPr id="40" name="Straight Connector 39">
+            <a:extLst>
+              <a:ext uri="{FF2B5EF4-FFF2-40B4-BE49-F238E27FC236}">
+                <a16:creationId xmlns:a16="http://schemas.microsoft.com/office/drawing/2014/main" id="{BE46A68E-9928-42DD-ABED-1A5E7020EE5D}"/>
+              </a:ext>
+            </a:extLst>
+          </p:cNvPr>
+          <p:cNvCxnSpPr>
+            <a:cxnSpLocks/>
+            <a:endCxn id="39" idx="2"/>
+          </p:cNvCxnSpPr>
+          <p:nvPr/>
+        </p:nvCxnSpPr>
+        <p:spPr>
+          <a:xfrm>
+            <a:off x="7466481" y="3009552"/>
+            <a:ext cx="744300" cy="0"/>
+          </a:xfrm>
+          <a:prstGeom prst="line">
+            <a:avLst/>
+          </a:prstGeom>
+        </p:spPr>
+        <p:style>
+          <a:lnRef idx="1">
+            <a:schemeClr val="accent2"/>
+          </a:lnRef>
+          <a:fillRef idx="0">
+            <a:schemeClr val="accent2"/>
+          </a:fillRef>
+          <a:effectRef idx="0">
+            <a:schemeClr val="accent2"/>
+          </a:effectRef>
+          <a:fontRef idx="minor">
+            <a:schemeClr val="tx1"/>
+          </a:fontRef>
+        </p:style>
+      </p:cxnSp>
+      <p:cxnSp>
+        <p:nvCxnSpPr>
+          <p:cNvPr id="41" name="Straight Connector 40">
+            <a:extLst>
+              <a:ext uri="{FF2B5EF4-FFF2-40B4-BE49-F238E27FC236}">
+                <a16:creationId xmlns:a16="http://schemas.microsoft.com/office/drawing/2014/main" id="{5A5BF005-9A28-45FB-A77C-F9EA7C8E9519}"/>
+              </a:ext>
+            </a:extLst>
+          </p:cNvPr>
+          <p:cNvCxnSpPr>
+            <a:cxnSpLocks/>
+          </p:cNvCxnSpPr>
+          <p:nvPr/>
+        </p:nvCxnSpPr>
+        <p:spPr>
+          <a:xfrm>
+            <a:off x="7454700" y="5295548"/>
+            <a:ext cx="744300" cy="0"/>
+          </a:xfrm>
+          <a:prstGeom prst="line">
+            <a:avLst/>
+          </a:prstGeom>
+        </p:spPr>
+        <p:style>
+          <a:lnRef idx="1">
+            <a:schemeClr val="accent2"/>
+          </a:lnRef>
+          <a:fillRef idx="0">
+            <a:schemeClr val="accent2"/>
+          </a:fillRef>
+          <a:effectRef idx="0">
+            <a:schemeClr val="accent2"/>
+          </a:effectRef>
+          <a:fontRef idx="minor">
+            <a:schemeClr val="tx1"/>
+          </a:fontRef>
+        </p:style>
+      </p:cxnSp>
+      <p:sp>
+        <p:nvSpPr>
+          <p:cNvPr id="42" name="Oval 41">
+            <a:extLst>
+              <a:ext uri="{FF2B5EF4-FFF2-40B4-BE49-F238E27FC236}">
+                <a16:creationId xmlns:a16="http://schemas.microsoft.com/office/drawing/2014/main" id="{456A073F-52B3-4AC3-A87E-E15C8F59590A}"/>
+              </a:ext>
+            </a:extLst>
+          </p:cNvPr>
+          <p:cNvSpPr/>
+          <p:nvPr/>
+        </p:nvSpPr>
+        <p:spPr>
+          <a:xfrm>
+            <a:off x="8210781" y="4876099"/>
+            <a:ext cx="838800" cy="838899"/>
+          </a:xfrm>
+          <a:prstGeom prst="ellipse">
+            <a:avLst/>
+          </a:prstGeom>
+          <a:solidFill>
+            <a:schemeClr val="accent1">
+              <a:alpha val="50000"/>
+            </a:schemeClr>
+          </a:solidFill>
+          <a:ln>
+            <a:noFill/>
+          </a:ln>
+        </p:spPr>
+        <p:style>
+          <a:lnRef idx="0">
+            <a:scrgbClr r="0" g="0" b="0"/>
+          </a:lnRef>
+          <a:fillRef idx="0">
+            <a:scrgbClr r="0" g="0" b="0"/>
+          </a:fillRef>
+          <a:effectRef idx="0">
+            <a:scrgbClr r="0" g="0" b="0"/>
+          </a:effectRef>
+          <a:fontRef idx="minor">
+            <a:schemeClr val="lt1"/>
+          </a:fontRef>
+        </p:style>
+        <p:txBody>
+          <a:bodyPr rtlCol="0" anchor="ctr"/>
+          <a:lstStyle/>
+          <a:p>
+            <a:pPr algn="ctr"/>
+            <a:endParaRPr lang="en-GB" dirty="0"/>
+          </a:p>
+        </p:txBody>
+      </p:sp>
+    </p:spTree>
+    <p:extLst>
+      <p:ext uri="{BB962C8B-B14F-4D97-AF65-F5344CB8AC3E}">
+        <p14:creationId xmlns:p14="http://schemas.microsoft.com/office/powerpoint/2010/main" val="4155740284"/>
       </p:ext>
     </p:extLst>
   </p:cSld>

</xml_diff>

<commit_message>
create intro to merging page
</commit_message>
<xml_diff>
--- a/making basic workflow diagram.pptx
+++ b/making basic workflow diagram.pptx
@@ -2367,7 +2367,7 @@
           <a:p>
             <a:fld id="{D2CA4227-4145-44D2-848C-93785270C498}" type="datetimeFigureOut">
               <a:rPr lang="en-GB" smtClean="0"/>
-              <a:t>30/03/2021</a:t>
+              <a:t>31/03/2021</a:t>
             </a:fld>
             <a:endParaRPr lang="en-GB"/>
           </a:p>
@@ -2497,7 +2497,7 @@
           <a:p>
             <a:fld id="{548AE7BB-1ED1-42E9-BEEA-241DB2A206FC}" type="datetimeFigureOut">
               <a:rPr lang="en-GB" smtClean="0"/>
-              <a:t>30/03/2021</a:t>
+              <a:t>31/03/2021</a:t>
             </a:fld>
             <a:endParaRPr lang="en-GB"/>
           </a:p>
@@ -27445,13 +27445,13 @@
   <p:clrMapOvr>
     <a:masterClrMapping/>
   </p:clrMapOvr>
-  <mc:AlternateContent xmlns:mc="http://schemas.openxmlformats.org/markup-compatibility/2006">
-    <mc:Choice xmlns:p14="http://schemas.microsoft.com/office/powerpoint/2010/main" Requires="p14">
+  <mc:AlternateContent xmlns:mc="http://schemas.openxmlformats.org/markup-compatibility/2006" xmlns:p14="http://schemas.microsoft.com/office/powerpoint/2010/main">
+    <mc:Choice Requires="p14">
       <p:transition spd="med" p14:dur="700">
         <p:fade/>
       </p:transition>
     </mc:Choice>
-    <mc:Fallback>
+    <mc:Fallback xmlns="">
       <p:transition spd="med">
         <p:fade/>
       </p:transition>
@@ -31801,7 +31801,7 @@
             <a:pPr algn="ctr"/>
             <a:r>
               <a:rPr lang="en-GB" dirty="0"/>
-              <a:t>Finally, we might want the </a:t>
+              <a:t>Finally, we might want </a:t>
             </a:r>
             <a:r>
               <a:rPr lang="en-GB" dirty="0" err="1"/>
@@ -33321,7 +33321,7 @@
             <a:pPr algn="ctr"/>
             <a:r>
               <a:rPr lang="en-GB" sz="1600" dirty="0"/>
-              <a:t>master*</a:t>
+              <a:t>master</a:t>
             </a:r>
           </a:p>
           <a:p>
@@ -33330,7 +33330,10 @@
               <a:rPr lang="en-GB" sz="1600" dirty="0" err="1"/>
               <a:t>new_branch</a:t>
             </a:r>
-            <a:endParaRPr lang="en-GB" sz="1600" dirty="0"/>
+            <a:r>
+              <a:rPr lang="en-GB" sz="1600" dirty="0"/>
+              <a:t>*</a:t>
+            </a:r>
           </a:p>
         </p:txBody>
       </p:sp>

</xml_diff>